<commit_message>
Reordered chapters and moved files
- I moved around some files to reorganize the book a little bit. 
- Part III is now Accessing Data
- Descriptive analysis is not Part IV
- I created Part V, data management 
- Presenting results was pushed back to Part VI
- Changed the folders and paths for all the image files that were affected by changing the chapter ordering around.
- Changed all existing instances of "data access" (or similar) to "data transfer". This includes the PowerPoint slides.
</commit_message>
<xml_diff>
--- a/img/01_part_getting_started/02_what_is_r/what_is_r.pptx
+++ b/img/01_part_getting_started/02_what_is_r/what_is_r.pptx
@@ -974,6 +974,10 @@
           <a:bodyPr/>
           <a:lstStyle/>
           <a:p>
+            <a:r>
+              <a:rPr lang="en-US" dirty="0" err="1"/>
+              <a:t>competencies_overview</a:t>
+            </a:r>
             <a:endParaRPr dirty="0"/>
           </a:p>
         </p:txBody>
@@ -1054,6 +1058,10 @@
           <a:bodyPr/>
           <a:lstStyle/>
           <a:p>
+            <a:r>
+              <a:rPr lang="en-US" dirty="0" err="1"/>
+              <a:t>competencies_transfer</a:t>
+            </a:r>
             <a:endParaRPr lang="en-US" dirty="0"/>
           </a:p>
         </p:txBody>
@@ -2711,7 +2719,7 @@
           </a:ln>
           <a:extLst>
             <a:ext uri="{C572A759-6A51-4108-AA02-DFA0A04FC94B}">
-              <ma14:wrappingTextBoxFlag xmlns="" xmlns:m="http://schemas.openxmlformats.org/officeDocument/2006/math" xmlns:a14="http://schemas.microsoft.com/office/drawing/2010/main" xmlns:ma14="http://schemas.microsoft.com/office/mac/drawingml/2011/main" val="1"/>
+              <ma14:wrappingTextBoxFlag xmlns:ma14="http://schemas.microsoft.com/office/mac/drawingml/2011/main" xmlns:a14="http://schemas.microsoft.com/office/drawing/2010/main" xmlns:m="http://schemas.openxmlformats.org/officeDocument/2006/math" xmlns="" val="1"/>
             </a:ext>
           </a:extLst>
         </p:spPr>
@@ -2750,7 +2758,7 @@
           </a:ln>
           <a:extLst>
             <a:ext uri="{C572A759-6A51-4108-AA02-DFA0A04FC94B}">
-              <ma14:wrappingTextBoxFlag xmlns="" xmlns:m="http://schemas.openxmlformats.org/officeDocument/2006/math" xmlns:a14="http://schemas.microsoft.com/office/drawing/2010/main" xmlns:ma14="http://schemas.microsoft.com/office/mac/drawingml/2011/main" val="1"/>
+              <ma14:wrappingTextBoxFlag xmlns:ma14="http://schemas.microsoft.com/office/mac/drawingml/2011/main" xmlns:a14="http://schemas.microsoft.com/office/drawing/2010/main" xmlns:m="http://schemas.openxmlformats.org/officeDocument/2006/math" xmlns="" val="1"/>
             </a:ext>
           </a:extLst>
         </p:spPr>
@@ -3950,7 +3958,7 @@
           </a:prstGeom>
           <a:extLst>
             <a:ext uri="{C572A759-6A51-4108-AA02-DFA0A04FC94B}">
-              <ma14:wrappingTextBoxFlag xmlns:ma14="http://schemas.microsoft.com/office/mac/drawingml/2011/main" xmlns:a14="http://schemas.microsoft.com/office/drawing/2010/main" xmlns:m="http://schemas.openxmlformats.org/officeDocument/2006/math" xmlns="" val="1"/>
+              <ma14:wrappingTextBoxFlag xmlns="" xmlns:m="http://schemas.openxmlformats.org/officeDocument/2006/math" xmlns:a14="http://schemas.microsoft.com/office/drawing/2010/main" xmlns:ma14="http://schemas.microsoft.com/office/mac/drawingml/2011/main" val="1"/>
             </a:ext>
           </a:extLst>
         </p:spPr>
@@ -4294,7 +4302,7 @@
                   <a:cs typeface="+mn-cs"/>
                   <a:sym typeface="Helvetica Light"/>
                 </a:rPr>
-                <a:t>Access</a:t>
+                <a:t>Transfer</a:t>
               </a:r>
             </a:p>
           </p:txBody>
@@ -5255,7 +5263,7 @@
                   <a:cs typeface="+mn-cs"/>
                   <a:sym typeface="Helvetica Light"/>
                 </a:rPr>
-                <a:t>Access</a:t>
+                <a:t>Transfer</a:t>
               </a:r>
             </a:p>
           </p:txBody>
@@ -5344,7 +5352,7 @@
             <a:effectLst/>
             <a:extLst>
               <a:ext uri="{C572A759-6A51-4108-AA02-DFA0A04FC94B}">
-                <ma14:wrappingTextBoxFlag xmlns="" xmlns:m="http://schemas.openxmlformats.org/officeDocument/2006/math" xmlns:a14="http://schemas.microsoft.com/office/drawing/2010/main" xmlns:ma14="http://schemas.microsoft.com/office/mac/drawingml/2011/main" val="1"/>
+                <ma14:wrappingTextBoxFlag xmlns:ma14="http://schemas.microsoft.com/office/mac/drawingml/2011/main" xmlns:a14="http://schemas.microsoft.com/office/drawing/2010/main" xmlns:m="http://schemas.openxmlformats.org/officeDocument/2006/math" xmlns="" val="1"/>
               </a:ext>
             </a:extLst>
           </p:spPr>
@@ -5444,7 +5452,7 @@
             <a:effectLst/>
             <a:extLst>
               <a:ext uri="{C572A759-6A51-4108-AA02-DFA0A04FC94B}">
-                <ma14:wrappingTextBoxFlag xmlns="" xmlns:m="http://schemas.openxmlformats.org/officeDocument/2006/math" xmlns:a14="http://schemas.microsoft.com/office/drawing/2010/main" xmlns:ma14="http://schemas.microsoft.com/office/mac/drawingml/2011/main" val="1"/>
+                <ma14:wrappingTextBoxFlag xmlns:ma14="http://schemas.microsoft.com/office/mac/drawingml/2011/main" xmlns:a14="http://schemas.microsoft.com/office/drawing/2010/main" xmlns:m="http://schemas.openxmlformats.org/officeDocument/2006/math" xmlns="" val="1"/>
               </a:ext>
             </a:extLst>
           </p:spPr>
@@ -5544,7 +5552,7 @@
             <a:effectLst/>
             <a:extLst>
               <a:ext uri="{C572A759-6A51-4108-AA02-DFA0A04FC94B}">
-                <ma14:wrappingTextBoxFlag xmlns="" xmlns:m="http://schemas.openxmlformats.org/officeDocument/2006/math" xmlns:a14="http://schemas.microsoft.com/office/drawing/2010/main" xmlns:ma14="http://schemas.microsoft.com/office/mac/drawingml/2011/main" val="1"/>
+                <ma14:wrappingTextBoxFlag xmlns:ma14="http://schemas.microsoft.com/office/mac/drawingml/2011/main" xmlns:a14="http://schemas.microsoft.com/office/drawing/2010/main" xmlns:m="http://schemas.openxmlformats.org/officeDocument/2006/math" xmlns="" val="1"/>
               </a:ext>
             </a:extLst>
           </p:spPr>
@@ -6066,7 +6074,7 @@
             </a:ln>
             <a:extLst>
               <a:ext uri="{C572A759-6A51-4108-AA02-DFA0A04FC94B}">
-                <ma14:wrappingTextBoxFlag xmlns="" xmlns:m="http://schemas.openxmlformats.org/officeDocument/2006/math" xmlns:a14="http://schemas.microsoft.com/office/drawing/2010/main" xmlns:ma14="http://schemas.microsoft.com/office/mac/drawingml/2011/main" val="1"/>
+                <ma14:wrappingTextBoxFlag xmlns:ma14="http://schemas.microsoft.com/office/mac/drawingml/2011/main" xmlns:a14="http://schemas.microsoft.com/office/drawing/2010/main" xmlns:m="http://schemas.openxmlformats.org/officeDocument/2006/math" xmlns="" val="1"/>
               </a:ext>
             </a:extLst>
           </p:spPr>
@@ -6321,7 +6329,7 @@
           </a:ln>
           <a:extLst>
             <a:ext uri="{C572A759-6A51-4108-AA02-DFA0A04FC94B}">
-              <ma14:wrappingTextBoxFlag xmlns="" xmlns:m="http://schemas.openxmlformats.org/officeDocument/2006/math" xmlns:a14="http://schemas.microsoft.com/office/drawing/2010/main" xmlns:ma14="http://schemas.microsoft.com/office/mac/drawingml/2011/main" val="1"/>
+              <ma14:wrappingTextBoxFlag xmlns:ma14="http://schemas.microsoft.com/office/mac/drawingml/2011/main" xmlns:a14="http://schemas.microsoft.com/office/drawing/2010/main" xmlns:m="http://schemas.openxmlformats.org/officeDocument/2006/math" xmlns="" val="1"/>
             </a:ext>
           </a:extLst>
         </p:spPr>
@@ -6356,7 +6364,7 @@
           </a:ln>
           <a:extLst>
             <a:ext uri="{C572A759-6A51-4108-AA02-DFA0A04FC94B}">
-              <ma14:wrappingTextBoxFlag xmlns="" xmlns:m="http://schemas.openxmlformats.org/officeDocument/2006/math" xmlns:a14="http://schemas.microsoft.com/office/drawing/2010/main" xmlns:ma14="http://schemas.microsoft.com/office/mac/drawingml/2011/main" val="1"/>
+              <ma14:wrappingTextBoxFlag xmlns:ma14="http://schemas.microsoft.com/office/mac/drawingml/2011/main" xmlns:a14="http://schemas.microsoft.com/office/drawing/2010/main" xmlns:m="http://schemas.openxmlformats.org/officeDocument/2006/math" xmlns="" val="1"/>
             </a:ext>
           </a:extLst>
         </p:spPr>
@@ -6403,7 +6411,7 @@
           </a:ln>
           <a:extLst>
             <a:ext uri="{C572A759-6A51-4108-AA02-DFA0A04FC94B}">
-              <ma14:wrappingTextBoxFlag xmlns="" xmlns:m="http://schemas.openxmlformats.org/officeDocument/2006/math" xmlns:a14="http://schemas.microsoft.com/office/drawing/2010/main" xmlns:ma14="http://schemas.microsoft.com/office/mac/drawingml/2011/main" val="1"/>
+              <ma14:wrappingTextBoxFlag xmlns:ma14="http://schemas.microsoft.com/office/mac/drawingml/2011/main" xmlns:a14="http://schemas.microsoft.com/office/drawing/2010/main" xmlns:m="http://schemas.openxmlformats.org/officeDocument/2006/math" xmlns="" val="1"/>
             </a:ext>
           </a:extLst>
         </p:spPr>
@@ -6438,7 +6446,7 @@
           </a:ln>
           <a:extLst>
             <a:ext uri="{C572A759-6A51-4108-AA02-DFA0A04FC94B}">
-              <ma14:wrappingTextBoxFlag xmlns="" xmlns:m="http://schemas.openxmlformats.org/officeDocument/2006/math" xmlns:a14="http://schemas.microsoft.com/office/drawing/2010/main" xmlns:ma14="http://schemas.microsoft.com/office/mac/drawingml/2011/main" val="1"/>
+              <ma14:wrappingTextBoxFlag xmlns:ma14="http://schemas.microsoft.com/office/mac/drawingml/2011/main" xmlns:a14="http://schemas.microsoft.com/office/drawing/2010/main" xmlns:m="http://schemas.openxmlformats.org/officeDocument/2006/math" xmlns="" val="1"/>
             </a:ext>
           </a:extLst>
         </p:spPr>
@@ -6708,7 +6716,7 @@
         <p:dissolve/>
       </p:transition>
     </mc:Choice>
-    <mc:Fallback xmlns="" xmlns:m="http://schemas.openxmlformats.org/officeDocument/2006/math" xmlns:a14="http://schemas.microsoft.com/office/drawing/2010/main">
+    <mc:Fallback xmlns:a14="http://schemas.microsoft.com/office/drawing/2010/main" xmlns:m="http://schemas.openxmlformats.org/officeDocument/2006/math" xmlns="">
       <p:transition spd="slow">
         <p:fade/>
       </p:transition>
@@ -6941,7 +6949,7 @@
           </a:ln>
           <a:extLst>
             <a:ext uri="{C572A759-6A51-4108-AA02-DFA0A04FC94B}">
-              <ma14:wrappingTextBoxFlag xmlns="" xmlns:m="http://schemas.openxmlformats.org/officeDocument/2006/math" xmlns:a14="http://schemas.microsoft.com/office/drawing/2010/main" xmlns:ma14="http://schemas.microsoft.com/office/mac/drawingml/2011/main" val="1"/>
+              <ma14:wrappingTextBoxFlag xmlns:ma14="http://schemas.microsoft.com/office/mac/drawingml/2011/main" xmlns:a14="http://schemas.microsoft.com/office/drawing/2010/main" xmlns:m="http://schemas.openxmlformats.org/officeDocument/2006/math" xmlns="" val="1"/>
             </a:ext>
           </a:extLst>
         </p:spPr>
@@ -6987,7 +6995,7 @@
           </a:ln>
           <a:extLst>
             <a:ext uri="{C572A759-6A51-4108-AA02-DFA0A04FC94B}">
-              <ma14:wrappingTextBoxFlag xmlns="" xmlns:m="http://schemas.openxmlformats.org/officeDocument/2006/math" xmlns:a14="http://schemas.microsoft.com/office/drawing/2010/main" xmlns:ma14="http://schemas.microsoft.com/office/mac/drawingml/2011/main" val="1"/>
+              <ma14:wrappingTextBoxFlag xmlns:ma14="http://schemas.microsoft.com/office/mac/drawingml/2011/main" xmlns:a14="http://schemas.microsoft.com/office/drawing/2010/main" xmlns:m="http://schemas.openxmlformats.org/officeDocument/2006/math" xmlns="" val="1"/>
             </a:ext>
           </a:extLst>
         </p:spPr>
@@ -7350,7 +7358,7 @@
         <p:dissolve/>
       </p:transition>
     </mc:Choice>
-    <mc:Fallback xmlns="" xmlns:m="http://schemas.openxmlformats.org/officeDocument/2006/math" xmlns:a14="http://schemas.microsoft.com/office/drawing/2010/main">
+    <mc:Fallback xmlns:a14="http://schemas.microsoft.com/office/drawing/2010/main" xmlns:m="http://schemas.openxmlformats.org/officeDocument/2006/math" xmlns="">
       <p:transition spd="slow">
         <p:fade/>
       </p:transition>
@@ -7412,7 +7420,7 @@
             <a:effectLst/>
             <a:extLst>
               <a:ext uri="{C572A759-6A51-4108-AA02-DFA0A04FC94B}">
-                <ma14:wrappingTextBoxFlag xmlns="" xmlns:m="http://schemas.openxmlformats.org/officeDocument/2006/math" xmlns:a14="http://schemas.microsoft.com/office/drawing/2010/main" xmlns:ma14="http://schemas.microsoft.com/office/mac/drawingml/2011/main" val="1"/>
+                <ma14:wrappingTextBoxFlag xmlns:ma14="http://schemas.microsoft.com/office/mac/drawingml/2011/main" xmlns:a14="http://schemas.microsoft.com/office/drawing/2010/main" xmlns:m="http://schemas.openxmlformats.org/officeDocument/2006/math" xmlns="" val="1"/>
               </a:ext>
             </a:extLst>
           </p:spPr>
@@ -8310,7 +8318,7 @@
             <a:effectLst/>
             <a:extLst>
               <a:ext uri="{C572A759-6A51-4108-AA02-DFA0A04FC94B}">
-                <ma14:wrappingTextBoxFlag xmlns="" xmlns:m="http://schemas.openxmlformats.org/officeDocument/2006/math" xmlns:a14="http://schemas.microsoft.com/office/drawing/2010/main" xmlns:ma14="http://schemas.microsoft.com/office/mac/drawingml/2011/main" val="1"/>
+                <ma14:wrappingTextBoxFlag xmlns:ma14="http://schemas.microsoft.com/office/mac/drawingml/2011/main" xmlns:a14="http://schemas.microsoft.com/office/drawing/2010/main" xmlns:m="http://schemas.openxmlformats.org/officeDocument/2006/math" xmlns="" val="1"/>
               </a:ext>
             </a:extLst>
           </p:spPr>
@@ -8932,7 +8940,7 @@
         <p:dissolve/>
       </p:transition>
     </mc:Choice>
-    <mc:Fallback xmlns="" xmlns:m="http://schemas.openxmlformats.org/officeDocument/2006/math" xmlns:a14="http://schemas.microsoft.com/office/drawing/2010/main">
+    <mc:Fallback xmlns:a14="http://schemas.microsoft.com/office/drawing/2010/main" xmlns:m="http://schemas.openxmlformats.org/officeDocument/2006/math" xmlns="">
       <p:transition spd="slow">
         <p:fade/>
       </p:transition>

</xml_diff>

<commit_message>
Fixed typos and added acknowledgements
</commit_message>
<xml_diff>
--- a/img/01_part_getting_started/02_what_is_r/what_is_r.pptx
+++ b/img/01_part_getting_started/02_what_is_r/what_is_r.pptx
@@ -2719,7 +2719,7 @@
           </a:ln>
           <a:extLst>
             <a:ext uri="{C572A759-6A51-4108-AA02-DFA0A04FC94B}">
-              <ma14:wrappingTextBoxFlag xmlns:ma14="http://schemas.microsoft.com/office/mac/drawingml/2011/main" xmlns:a14="http://schemas.microsoft.com/office/drawing/2010/main" xmlns:m="http://schemas.openxmlformats.org/officeDocument/2006/math" xmlns="" val="1"/>
+              <ma14:wrappingTextBoxFlag xmlns="" xmlns:m="http://schemas.openxmlformats.org/officeDocument/2006/math" xmlns:a14="http://schemas.microsoft.com/office/drawing/2010/main" xmlns:ma14="http://schemas.microsoft.com/office/mac/drawingml/2011/main" val="1"/>
             </a:ext>
           </a:extLst>
         </p:spPr>
@@ -2758,7 +2758,7 @@
           </a:ln>
           <a:extLst>
             <a:ext uri="{C572A759-6A51-4108-AA02-DFA0A04FC94B}">
-              <ma14:wrappingTextBoxFlag xmlns:ma14="http://schemas.microsoft.com/office/mac/drawingml/2011/main" xmlns:a14="http://schemas.microsoft.com/office/drawing/2010/main" xmlns:m="http://schemas.openxmlformats.org/officeDocument/2006/math" xmlns="" val="1"/>
+              <ma14:wrappingTextBoxFlag xmlns="" xmlns:m="http://schemas.openxmlformats.org/officeDocument/2006/math" xmlns:a14="http://schemas.microsoft.com/office/drawing/2010/main" xmlns:ma14="http://schemas.microsoft.com/office/mac/drawingml/2011/main" val="1"/>
             </a:ext>
           </a:extLst>
         </p:spPr>
@@ -3958,7 +3958,7 @@
           </a:prstGeom>
           <a:extLst>
             <a:ext uri="{C572A759-6A51-4108-AA02-DFA0A04FC94B}">
-              <ma14:wrappingTextBoxFlag xmlns="" xmlns:m="http://schemas.openxmlformats.org/officeDocument/2006/math" xmlns:a14="http://schemas.microsoft.com/office/drawing/2010/main" xmlns:ma14="http://schemas.microsoft.com/office/mac/drawingml/2011/main" val="1"/>
+              <ma14:wrappingTextBoxFlag xmlns:ma14="http://schemas.microsoft.com/office/mac/drawingml/2011/main" xmlns:a14="http://schemas.microsoft.com/office/drawing/2010/main" xmlns:m="http://schemas.openxmlformats.org/officeDocument/2006/math" xmlns="" val="1"/>
             </a:ext>
           </a:extLst>
         </p:spPr>
@@ -5352,7 +5352,7 @@
             <a:effectLst/>
             <a:extLst>
               <a:ext uri="{C572A759-6A51-4108-AA02-DFA0A04FC94B}">
-                <ma14:wrappingTextBoxFlag xmlns:ma14="http://schemas.microsoft.com/office/mac/drawingml/2011/main" xmlns:a14="http://schemas.microsoft.com/office/drawing/2010/main" xmlns:m="http://schemas.openxmlformats.org/officeDocument/2006/math" xmlns="" val="1"/>
+                <ma14:wrappingTextBoxFlag xmlns="" xmlns:m="http://schemas.openxmlformats.org/officeDocument/2006/math" xmlns:a14="http://schemas.microsoft.com/office/drawing/2010/main" xmlns:ma14="http://schemas.microsoft.com/office/mac/drawingml/2011/main" val="1"/>
               </a:ext>
             </a:extLst>
           </p:spPr>
@@ -5452,7 +5452,7 @@
             <a:effectLst/>
             <a:extLst>
               <a:ext uri="{C572A759-6A51-4108-AA02-DFA0A04FC94B}">
-                <ma14:wrappingTextBoxFlag xmlns:ma14="http://schemas.microsoft.com/office/mac/drawingml/2011/main" xmlns:a14="http://schemas.microsoft.com/office/drawing/2010/main" xmlns:m="http://schemas.openxmlformats.org/officeDocument/2006/math" xmlns="" val="1"/>
+                <ma14:wrappingTextBoxFlag xmlns="" xmlns:m="http://schemas.openxmlformats.org/officeDocument/2006/math" xmlns:a14="http://schemas.microsoft.com/office/drawing/2010/main" xmlns:ma14="http://schemas.microsoft.com/office/mac/drawingml/2011/main" val="1"/>
               </a:ext>
             </a:extLst>
           </p:spPr>
@@ -5552,7 +5552,7 @@
             <a:effectLst/>
             <a:extLst>
               <a:ext uri="{C572A759-6A51-4108-AA02-DFA0A04FC94B}">
-                <ma14:wrappingTextBoxFlag xmlns:ma14="http://schemas.microsoft.com/office/mac/drawingml/2011/main" xmlns:a14="http://schemas.microsoft.com/office/drawing/2010/main" xmlns:m="http://schemas.openxmlformats.org/officeDocument/2006/math" xmlns="" val="1"/>
+                <ma14:wrappingTextBoxFlag xmlns="" xmlns:m="http://schemas.openxmlformats.org/officeDocument/2006/math" xmlns:a14="http://schemas.microsoft.com/office/drawing/2010/main" xmlns:ma14="http://schemas.microsoft.com/office/mac/drawingml/2011/main" val="1"/>
               </a:ext>
             </a:extLst>
           </p:spPr>
@@ -6074,7 +6074,7 @@
             </a:ln>
             <a:extLst>
               <a:ext uri="{C572A759-6A51-4108-AA02-DFA0A04FC94B}">
-                <ma14:wrappingTextBoxFlag xmlns:ma14="http://schemas.microsoft.com/office/mac/drawingml/2011/main" xmlns:a14="http://schemas.microsoft.com/office/drawing/2010/main" xmlns:m="http://schemas.openxmlformats.org/officeDocument/2006/math" xmlns="" val="1"/>
+                <ma14:wrappingTextBoxFlag xmlns="" xmlns:m="http://schemas.openxmlformats.org/officeDocument/2006/math" xmlns:a14="http://schemas.microsoft.com/office/drawing/2010/main" xmlns:ma14="http://schemas.microsoft.com/office/mac/drawingml/2011/main" val="1"/>
               </a:ext>
             </a:extLst>
           </p:spPr>
@@ -6329,7 +6329,7 @@
           </a:ln>
           <a:extLst>
             <a:ext uri="{C572A759-6A51-4108-AA02-DFA0A04FC94B}">
-              <ma14:wrappingTextBoxFlag xmlns:ma14="http://schemas.microsoft.com/office/mac/drawingml/2011/main" xmlns:a14="http://schemas.microsoft.com/office/drawing/2010/main" xmlns:m="http://schemas.openxmlformats.org/officeDocument/2006/math" xmlns="" val="1"/>
+              <ma14:wrappingTextBoxFlag xmlns="" xmlns:m="http://schemas.openxmlformats.org/officeDocument/2006/math" xmlns:a14="http://schemas.microsoft.com/office/drawing/2010/main" xmlns:ma14="http://schemas.microsoft.com/office/mac/drawingml/2011/main" val="1"/>
             </a:ext>
           </a:extLst>
         </p:spPr>
@@ -6364,7 +6364,7 @@
           </a:ln>
           <a:extLst>
             <a:ext uri="{C572A759-6A51-4108-AA02-DFA0A04FC94B}">
-              <ma14:wrappingTextBoxFlag xmlns:ma14="http://schemas.microsoft.com/office/mac/drawingml/2011/main" xmlns:a14="http://schemas.microsoft.com/office/drawing/2010/main" xmlns:m="http://schemas.openxmlformats.org/officeDocument/2006/math" xmlns="" val="1"/>
+              <ma14:wrappingTextBoxFlag xmlns="" xmlns:m="http://schemas.openxmlformats.org/officeDocument/2006/math" xmlns:a14="http://schemas.microsoft.com/office/drawing/2010/main" xmlns:ma14="http://schemas.microsoft.com/office/mac/drawingml/2011/main" val="1"/>
             </a:ext>
           </a:extLst>
         </p:spPr>
@@ -6411,7 +6411,7 @@
           </a:ln>
           <a:extLst>
             <a:ext uri="{C572A759-6A51-4108-AA02-DFA0A04FC94B}">
-              <ma14:wrappingTextBoxFlag xmlns:ma14="http://schemas.microsoft.com/office/mac/drawingml/2011/main" xmlns:a14="http://schemas.microsoft.com/office/drawing/2010/main" xmlns:m="http://schemas.openxmlformats.org/officeDocument/2006/math" xmlns="" val="1"/>
+              <ma14:wrappingTextBoxFlag xmlns="" xmlns:m="http://schemas.openxmlformats.org/officeDocument/2006/math" xmlns:a14="http://schemas.microsoft.com/office/drawing/2010/main" xmlns:ma14="http://schemas.microsoft.com/office/mac/drawingml/2011/main" val="1"/>
             </a:ext>
           </a:extLst>
         </p:spPr>
@@ -6446,7 +6446,7 @@
           </a:ln>
           <a:extLst>
             <a:ext uri="{C572A759-6A51-4108-AA02-DFA0A04FC94B}">
-              <ma14:wrappingTextBoxFlag xmlns:ma14="http://schemas.microsoft.com/office/mac/drawingml/2011/main" xmlns:a14="http://schemas.microsoft.com/office/drawing/2010/main" xmlns:m="http://schemas.openxmlformats.org/officeDocument/2006/math" xmlns="" val="1"/>
+              <ma14:wrappingTextBoxFlag xmlns="" xmlns:m="http://schemas.openxmlformats.org/officeDocument/2006/math" xmlns:a14="http://schemas.microsoft.com/office/drawing/2010/main" xmlns:ma14="http://schemas.microsoft.com/office/mac/drawingml/2011/main" val="1"/>
             </a:ext>
           </a:extLst>
         </p:spPr>
@@ -6716,7 +6716,7 @@
         <p:dissolve/>
       </p:transition>
     </mc:Choice>
-    <mc:Fallback xmlns:a14="http://schemas.microsoft.com/office/drawing/2010/main" xmlns:m="http://schemas.openxmlformats.org/officeDocument/2006/math" xmlns="">
+    <mc:Fallback xmlns="" xmlns:m="http://schemas.openxmlformats.org/officeDocument/2006/math" xmlns:a14="http://schemas.microsoft.com/office/drawing/2010/main">
       <p:transition spd="slow">
         <p:fade/>
       </p:transition>
@@ -6938,8 +6938,8 @@
         </p:nvSpPr>
         <p:spPr>
           <a:xfrm>
-            <a:off x="518632" y="9116849"/>
-            <a:ext cx="7256794" cy="1641475"/>
+            <a:off x="483366" y="9116849"/>
+            <a:ext cx="7327327" cy="1641475"/>
           </a:xfrm>
           <a:prstGeom prst="rect">
             <a:avLst/>
@@ -6949,7 +6949,7 @@
           </a:ln>
           <a:extLst>
             <a:ext uri="{C572A759-6A51-4108-AA02-DFA0A04FC94B}">
-              <ma14:wrappingTextBoxFlag xmlns:ma14="http://schemas.microsoft.com/office/mac/drawingml/2011/main" xmlns:a14="http://schemas.microsoft.com/office/drawing/2010/main" xmlns:m="http://schemas.openxmlformats.org/officeDocument/2006/math" xmlns="" val="1"/>
+              <ma14:wrappingTextBoxFlag xmlns="" xmlns:m="http://schemas.openxmlformats.org/officeDocument/2006/math" xmlns:a14="http://schemas.microsoft.com/office/drawing/2010/main" xmlns:ma14="http://schemas.microsoft.com/office/mac/drawingml/2011/main" val="1"/>
             </a:ext>
           </a:extLst>
         </p:spPr>
@@ -6965,7 +6965,15 @@
             </a:r>
             <a:r>
               <a:rPr lang="en-US" dirty="0"/>
-              <a:t>(One variable)</a:t>
+              <a:t>(</a:t>
+            </a:r>
+            <a:r>
+              <a:rPr lang="en-US"/>
+              <a:t>One Variable</a:t>
+            </a:r>
+            <a:r>
+              <a:rPr lang="en-US" dirty="0"/>
+              <a:t>)</a:t>
             </a:r>
           </a:p>
           <a:p>
@@ -6995,7 +7003,7 @@
           </a:ln>
           <a:extLst>
             <a:ext uri="{C572A759-6A51-4108-AA02-DFA0A04FC94B}">
-              <ma14:wrappingTextBoxFlag xmlns:ma14="http://schemas.microsoft.com/office/mac/drawingml/2011/main" xmlns:a14="http://schemas.microsoft.com/office/drawing/2010/main" xmlns:m="http://schemas.openxmlformats.org/officeDocument/2006/math" xmlns="" val="1"/>
+              <ma14:wrappingTextBoxFlag xmlns="" xmlns:m="http://schemas.openxmlformats.org/officeDocument/2006/math" xmlns:a14="http://schemas.microsoft.com/office/drawing/2010/main" xmlns:ma14="http://schemas.microsoft.com/office/mac/drawingml/2011/main" val="1"/>
             </a:ext>
           </a:extLst>
         </p:spPr>
@@ -7269,7 +7277,7 @@
         <p:spPr>
           <a:xfrm rot="5400000">
             <a:off x="6874652" y="3799501"/>
-            <a:ext cx="2589726" cy="8044971"/>
+            <a:ext cx="2589726" cy="8044970"/>
           </a:xfrm>
           <a:prstGeom prst="bentConnector3">
             <a:avLst/>
@@ -7358,7 +7366,7 @@
         <p:dissolve/>
       </p:transition>
     </mc:Choice>
-    <mc:Fallback xmlns:a14="http://schemas.microsoft.com/office/drawing/2010/main" xmlns:m="http://schemas.openxmlformats.org/officeDocument/2006/math" xmlns="">
+    <mc:Fallback xmlns="" xmlns:m="http://schemas.openxmlformats.org/officeDocument/2006/math" xmlns:a14="http://schemas.microsoft.com/office/drawing/2010/main">
       <p:transition spd="slow">
         <p:fade/>
       </p:transition>
@@ -7420,7 +7428,7 @@
             <a:effectLst/>
             <a:extLst>
               <a:ext uri="{C572A759-6A51-4108-AA02-DFA0A04FC94B}">
-                <ma14:wrappingTextBoxFlag xmlns:ma14="http://schemas.microsoft.com/office/mac/drawingml/2011/main" xmlns:a14="http://schemas.microsoft.com/office/drawing/2010/main" xmlns:m="http://schemas.openxmlformats.org/officeDocument/2006/math" xmlns="" val="1"/>
+                <ma14:wrappingTextBoxFlag xmlns="" xmlns:m="http://schemas.openxmlformats.org/officeDocument/2006/math" xmlns:a14="http://schemas.microsoft.com/office/drawing/2010/main" xmlns:ma14="http://schemas.microsoft.com/office/mac/drawingml/2011/main" val="1"/>
               </a:ext>
             </a:extLst>
           </p:spPr>
@@ -8318,7 +8326,7 @@
             <a:effectLst/>
             <a:extLst>
               <a:ext uri="{C572A759-6A51-4108-AA02-DFA0A04FC94B}">
-                <ma14:wrappingTextBoxFlag xmlns:ma14="http://schemas.microsoft.com/office/mac/drawingml/2011/main" xmlns:a14="http://schemas.microsoft.com/office/drawing/2010/main" xmlns:m="http://schemas.openxmlformats.org/officeDocument/2006/math" xmlns="" val="1"/>
+                <ma14:wrappingTextBoxFlag xmlns="" xmlns:m="http://schemas.openxmlformats.org/officeDocument/2006/math" xmlns:a14="http://schemas.microsoft.com/office/drawing/2010/main" xmlns:ma14="http://schemas.microsoft.com/office/mac/drawingml/2011/main" val="1"/>
               </a:ext>
             </a:extLst>
           </p:spPr>
@@ -8940,7 +8948,7 @@
         <p:dissolve/>
       </p:transition>
     </mc:Choice>
-    <mc:Fallback xmlns:a14="http://schemas.microsoft.com/office/drawing/2010/main" xmlns:m="http://schemas.openxmlformats.org/officeDocument/2006/math" xmlns="">
+    <mc:Fallback xmlns="" xmlns:m="http://schemas.openxmlformats.org/officeDocument/2006/math" xmlns:a14="http://schemas.microsoft.com/office/drawing/2010/main">
       <p:transition spd="slow">
         <p:fade/>
       </p:transition>

</xml_diff>

<commit_message>
Update What is R slides
2023-07-25: Made this slide for my presentation for Texas DSHS. I haven’t actually incorporated it into R4Epi yet.
</commit_message>
<xml_diff>
--- a/img/01_part_getting_started/02_what_is_r/what_is_r.pptx
+++ b/img/01_part_getting_started/02_what_is_r/what_is_r.pptx
@@ -5,15 +5,18 @@
     <p:sldMasterId id="2147483648" r:id="rId1"/>
   </p:sldMasterIdLst>
   <p:notesMasterIdLst>
-    <p:notesMasterId r:id="rId8"/>
+    <p:notesMasterId r:id="rId11"/>
   </p:notesMasterIdLst>
   <p:sldIdLst>
     <p:sldId id="260" r:id="rId2"/>
     <p:sldId id="282" r:id="rId3"/>
-    <p:sldId id="283" r:id="rId4"/>
-    <p:sldId id="267" r:id="rId5"/>
-    <p:sldId id="269" r:id="rId6"/>
-    <p:sldId id="271" r:id="rId7"/>
+    <p:sldId id="284" r:id="rId4"/>
+    <p:sldId id="283" r:id="rId5"/>
+    <p:sldId id="267" r:id="rId6"/>
+    <p:sldId id="269" r:id="rId7"/>
+    <p:sldId id="286" r:id="rId8"/>
+    <p:sldId id="271" r:id="rId9"/>
+    <p:sldId id="287" r:id="rId10"/>
   </p:sldIdLst>
   <p:sldSz cx="24384000" cy="13716000"/>
   <p:notesSz cx="6858000" cy="9144000"/>
@@ -738,9 +741,9 @@
         <a:spcPct val="125000"/>
       </a:lnSpc>
       <a:defRPr sz="2400">
-        <a:latin typeface="Avenir Roman"/>
-        <a:ea typeface="Avenir Roman"/>
-        <a:cs typeface="Avenir Roman"/>
+        <a:latin typeface="Avenir"/>
+        <a:ea typeface="Avenir"/>
+        <a:cs typeface="Avenir"/>
         <a:sym typeface="Avenir Roman"/>
       </a:defRPr>
     </a:lvl1pPr>
@@ -749,9 +752,9 @@
         <a:spcPct val="125000"/>
       </a:lnSpc>
       <a:defRPr sz="2400">
-        <a:latin typeface="Avenir Roman"/>
-        <a:ea typeface="Avenir Roman"/>
-        <a:cs typeface="Avenir Roman"/>
+        <a:latin typeface="Avenir"/>
+        <a:ea typeface="Avenir"/>
+        <a:cs typeface="Avenir"/>
         <a:sym typeface="Avenir Roman"/>
       </a:defRPr>
     </a:lvl2pPr>
@@ -760,9 +763,9 @@
         <a:spcPct val="125000"/>
       </a:lnSpc>
       <a:defRPr sz="2400">
-        <a:latin typeface="Avenir Roman"/>
-        <a:ea typeface="Avenir Roman"/>
-        <a:cs typeface="Avenir Roman"/>
+        <a:latin typeface="Avenir"/>
+        <a:ea typeface="Avenir"/>
+        <a:cs typeface="Avenir"/>
         <a:sym typeface="Avenir Roman"/>
       </a:defRPr>
     </a:lvl3pPr>
@@ -771,9 +774,9 @@
         <a:spcPct val="125000"/>
       </a:lnSpc>
       <a:defRPr sz="2400">
-        <a:latin typeface="Avenir Roman"/>
-        <a:ea typeface="Avenir Roman"/>
-        <a:cs typeface="Avenir Roman"/>
+        <a:latin typeface="Avenir"/>
+        <a:ea typeface="Avenir"/>
+        <a:cs typeface="Avenir"/>
         <a:sym typeface="Avenir Roman"/>
       </a:defRPr>
     </a:lvl4pPr>
@@ -782,9 +785,9 @@
         <a:spcPct val="125000"/>
       </a:lnSpc>
       <a:defRPr sz="2400">
-        <a:latin typeface="Avenir Roman"/>
-        <a:ea typeface="Avenir Roman"/>
-        <a:cs typeface="Avenir Roman"/>
+        <a:latin typeface="Avenir"/>
+        <a:ea typeface="Avenir"/>
+        <a:cs typeface="Avenir"/>
         <a:sym typeface="Avenir Roman"/>
       </a:defRPr>
     </a:lvl5pPr>
@@ -793,9 +796,9 @@
         <a:spcPct val="125000"/>
       </a:lnSpc>
       <a:defRPr sz="2400">
-        <a:latin typeface="Avenir Roman"/>
-        <a:ea typeface="Avenir Roman"/>
-        <a:cs typeface="Avenir Roman"/>
+        <a:latin typeface="Avenir"/>
+        <a:ea typeface="Avenir"/>
+        <a:cs typeface="Avenir"/>
         <a:sym typeface="Avenir Roman"/>
       </a:defRPr>
     </a:lvl6pPr>
@@ -804,9 +807,9 @@
         <a:spcPct val="125000"/>
       </a:lnSpc>
       <a:defRPr sz="2400">
-        <a:latin typeface="Avenir Roman"/>
-        <a:ea typeface="Avenir Roman"/>
-        <a:cs typeface="Avenir Roman"/>
+        <a:latin typeface="Avenir"/>
+        <a:ea typeface="Avenir"/>
+        <a:cs typeface="Avenir"/>
         <a:sym typeface="Avenir Roman"/>
       </a:defRPr>
     </a:lvl7pPr>
@@ -815,9 +818,9 @@
         <a:spcPct val="125000"/>
       </a:lnSpc>
       <a:defRPr sz="2400">
-        <a:latin typeface="Avenir Roman"/>
-        <a:ea typeface="Avenir Roman"/>
-        <a:cs typeface="Avenir Roman"/>
+        <a:latin typeface="Avenir"/>
+        <a:ea typeface="Avenir"/>
+        <a:cs typeface="Avenir"/>
         <a:sym typeface="Avenir Roman"/>
       </a:defRPr>
     </a:lvl8pPr>
@@ -826,9 +829,9 @@
         <a:spcPct val="125000"/>
       </a:lnSpc>
       <a:defRPr sz="2400">
-        <a:latin typeface="Avenir Roman"/>
-        <a:ea typeface="Avenir Roman"/>
-        <a:cs typeface="Avenir Roman"/>
+        <a:latin typeface="Avenir"/>
+        <a:ea typeface="Avenir"/>
+        <a:cs typeface="Avenir"/>
         <a:sym typeface="Avenir Roman"/>
       </a:defRPr>
     </a:lvl9pPr>
@@ -1014,6 +1017,90 @@
       </p:grpSpPr>
       <p:sp>
         <p:nvSpPr>
+          <p:cNvPr id="173" name="Shape 173"/>
+          <p:cNvSpPr>
+            <a:spLocks noGrp="1" noRot="1" noChangeAspect="1"/>
+          </p:cNvSpPr>
+          <p:nvPr>
+            <p:ph type="sldImg"/>
+          </p:nvPr>
+        </p:nvSpPr>
+        <p:spPr>
+          <a:xfrm>
+            <a:off x="381000" y="685800"/>
+            <a:ext cx="6096000" cy="3429000"/>
+          </a:xfrm>
+          <a:prstGeom prst="rect">
+            <a:avLst/>
+          </a:prstGeom>
+        </p:spPr>
+        <p:txBody>
+          <a:bodyPr/>
+          <a:lstStyle/>
+          <a:p>
+            <a:endParaRPr/>
+          </a:p>
+        </p:txBody>
+      </p:sp>
+      <p:sp>
+        <p:nvSpPr>
+          <p:cNvPr id="174" name="Shape 174"/>
+          <p:cNvSpPr>
+            <a:spLocks noGrp="1"/>
+          </p:cNvSpPr>
+          <p:nvPr>
+            <p:ph type="body" sz="quarter" idx="1"/>
+          </p:nvPr>
+        </p:nvSpPr>
+        <p:spPr>
+          <a:prstGeom prst="rect">
+            <a:avLst/>
+          </a:prstGeom>
+        </p:spPr>
+        <p:txBody>
+          <a:bodyPr/>
+          <a:lstStyle/>
+          <a:p>
+            <a:r>
+              <a:rPr lang="en-US" dirty="0"/>
+              <a:t>2023-07-25: Made this slide for my presentation for Texas DSHS. I haven’t actually incorporated it into R4Epi yet.</a:t>
+            </a:r>
+            <a:endParaRPr dirty="0"/>
+          </a:p>
+        </p:txBody>
+      </p:sp>
+    </p:spTree>
+    <p:extLst>
+      <p:ext uri="{BB962C8B-B14F-4D97-AF65-F5344CB8AC3E}">
+        <p14:creationId xmlns:p14="http://schemas.microsoft.com/office/powerpoint/2010/main" val="2639304968"/>
+      </p:ext>
+    </p:extLst>
+  </p:cSld>
+  <p:clrMapOvr>
+    <a:masterClrMapping/>
+  </p:clrMapOvr>
+</p:notes>
+</file>
+
+<file path=ppt/notesSlides/notesSlide4.xml><?xml version="1.0" encoding="utf-8"?>
+<p:notes xmlns:a="http://schemas.openxmlformats.org/drawingml/2006/main" xmlns:r="http://schemas.openxmlformats.org/officeDocument/2006/relationships" xmlns:p="http://schemas.openxmlformats.org/presentationml/2006/main">
+  <p:cSld>
+    <p:spTree>
+      <p:nvGrpSpPr>
+        <p:cNvPr id="1" name=""/>
+        <p:cNvGrpSpPr/>
+        <p:nvPr/>
+      </p:nvGrpSpPr>
+      <p:grpSpPr>
+        <a:xfrm>
+          <a:off x="0" y="0"/>
+          <a:ext cx="0" cy="0"/>
+          <a:chOff x="0" y="0"/>
+          <a:chExt cx="0" cy="0"/>
+        </a:xfrm>
+      </p:grpSpPr>
+      <p:sp>
+        <p:nvSpPr>
           <p:cNvPr id="177" name="Shape 177"/>
           <p:cNvSpPr>
             <a:spLocks noGrp="1" noRot="1" noChangeAspect="1"/>
@@ -1079,7 +1166,7 @@
 </p:notes>
 </file>
 
-<file path=ppt/notesSlides/notesSlide4.xml><?xml version="1.0" encoding="utf-8"?>
+<file path=ppt/notesSlides/notesSlide5.xml><?xml version="1.0" encoding="utf-8"?>
 <p:notes xmlns:a="http://schemas.openxmlformats.org/drawingml/2006/main" xmlns:r="http://schemas.openxmlformats.org/officeDocument/2006/relationships" xmlns:p="http://schemas.openxmlformats.org/presentationml/2006/main">
   <p:cSld>
     <p:spTree>
@@ -1154,7 +1241,7 @@
 </p:notes>
 </file>
 
-<file path=ppt/notesSlides/notesSlide5.xml><?xml version="1.0" encoding="utf-8"?>
+<file path=ppt/notesSlides/notesSlide6.xml><?xml version="1.0" encoding="utf-8"?>
 <p:notes xmlns:a="http://schemas.openxmlformats.org/drawingml/2006/main" xmlns:r="http://schemas.openxmlformats.org/officeDocument/2006/relationships" xmlns:p="http://schemas.openxmlformats.org/presentationml/2006/main">
   <p:cSld>
     <p:spTree>
@@ -1229,7 +1316,107 @@
 </p:notes>
 </file>
 
-<file path=ppt/notesSlides/notesSlide6.xml><?xml version="1.0" encoding="utf-8"?>
+<file path=ppt/notesSlides/notesSlide7.xml><?xml version="1.0" encoding="utf-8"?>
+<p:notes xmlns:a="http://schemas.openxmlformats.org/drawingml/2006/main" xmlns:r="http://schemas.openxmlformats.org/officeDocument/2006/relationships" xmlns:p="http://schemas.openxmlformats.org/presentationml/2006/main">
+  <p:cSld>
+    <p:spTree>
+      <p:nvGrpSpPr>
+        <p:cNvPr id="1" name=""/>
+        <p:cNvGrpSpPr/>
+        <p:nvPr/>
+      </p:nvGrpSpPr>
+      <p:grpSpPr>
+        <a:xfrm>
+          <a:off x="0" y="0"/>
+          <a:ext cx="0" cy="0"/>
+          <a:chOff x="0" y="0"/>
+          <a:chExt cx="0" cy="0"/>
+        </a:xfrm>
+      </p:grpSpPr>
+      <p:sp>
+        <p:nvSpPr>
+          <p:cNvPr id="206" name="Shape 206"/>
+          <p:cNvSpPr>
+            <a:spLocks noGrp="1" noRot="1" noChangeAspect="1"/>
+          </p:cNvSpPr>
+          <p:nvPr>
+            <p:ph type="sldImg"/>
+          </p:nvPr>
+        </p:nvSpPr>
+        <p:spPr>
+          <a:xfrm>
+            <a:off x="381000" y="685800"/>
+            <a:ext cx="6096000" cy="3429000"/>
+          </a:xfrm>
+          <a:prstGeom prst="rect">
+            <a:avLst/>
+          </a:prstGeom>
+        </p:spPr>
+        <p:txBody>
+          <a:bodyPr/>
+          <a:lstStyle/>
+          <a:p>
+            <a:endParaRPr/>
+          </a:p>
+        </p:txBody>
+      </p:sp>
+      <p:sp>
+        <p:nvSpPr>
+          <p:cNvPr id="207" name="Shape 207"/>
+          <p:cNvSpPr>
+            <a:spLocks noGrp="1"/>
+          </p:cNvSpPr>
+          <p:nvPr>
+            <p:ph type="body" sz="quarter" idx="1"/>
+          </p:nvPr>
+        </p:nvSpPr>
+        <p:spPr>
+          <a:prstGeom prst="rect">
+            <a:avLst/>
+          </a:prstGeom>
+        </p:spPr>
+        <p:txBody>
+          <a:bodyPr/>
+          <a:lstStyle/>
+          <a:p>
+            <a:pPr marL="0" marR="0" lvl="0" indent="0" defTabSz="457200" eaLnBrk="1" fontAlgn="auto" latinLnBrk="0" hangingPunct="1">
+              <a:lnSpc>
+                <a:spcPct val="125000"/>
+              </a:lnSpc>
+              <a:spcBef>
+                <a:spcPts val="0"/>
+              </a:spcBef>
+              <a:spcAft>
+                <a:spcPts val="0"/>
+              </a:spcAft>
+              <a:buClrTx/>
+              <a:buSzTx/>
+              <a:buFontTx/>
+              <a:buNone/>
+              <a:tabLst/>
+              <a:defRPr/>
+            </a:pPr>
+            <a:r>
+              <a:rPr lang="en-US" dirty="0"/>
+              <a:t>2023-07-25: Made this slide for my presentation for Texas DSHS. I haven’t actually incorporated it into R4Epi yet.</a:t>
+            </a:r>
+          </a:p>
+        </p:txBody>
+      </p:sp>
+    </p:spTree>
+    <p:extLst>
+      <p:ext uri="{BB962C8B-B14F-4D97-AF65-F5344CB8AC3E}">
+        <p14:creationId xmlns:p14="http://schemas.microsoft.com/office/powerpoint/2010/main" val="940908160"/>
+      </p:ext>
+    </p:extLst>
+  </p:cSld>
+  <p:clrMapOvr>
+    <a:masterClrMapping/>
+  </p:clrMapOvr>
+</p:notes>
+</file>
+
+<file path=ppt/notesSlides/notesSlide8.xml><?xml version="1.0" encoding="utf-8"?>
 <p:notes xmlns:a="http://schemas.openxmlformats.org/drawingml/2006/main" xmlns:r="http://schemas.openxmlformats.org/officeDocument/2006/relationships" xmlns:p="http://schemas.openxmlformats.org/presentationml/2006/main">
   <p:cSld>
     <p:spTree>
@@ -1297,6 +1484,99 @@
         </p:txBody>
       </p:sp>
     </p:spTree>
+  </p:cSld>
+  <p:clrMapOvr>
+    <a:masterClrMapping/>
+  </p:clrMapOvr>
+</p:notes>
+</file>
+
+<file path=ppt/notesSlides/notesSlide9.xml><?xml version="1.0" encoding="utf-8"?>
+<p:notes xmlns:a="http://schemas.openxmlformats.org/drawingml/2006/main" xmlns:r="http://schemas.openxmlformats.org/officeDocument/2006/relationships" xmlns:p="http://schemas.openxmlformats.org/presentationml/2006/main">
+  <p:cSld>
+    <p:spTree>
+      <p:nvGrpSpPr>
+        <p:cNvPr id="1" name=""/>
+        <p:cNvGrpSpPr/>
+        <p:nvPr/>
+      </p:nvGrpSpPr>
+      <p:grpSpPr>
+        <a:xfrm>
+          <a:off x="0" y="0"/>
+          <a:ext cx="0" cy="0"/>
+          <a:chOff x="0" y="0"/>
+          <a:chExt cx="0" cy="0"/>
+        </a:xfrm>
+      </p:grpSpPr>
+      <p:sp>
+        <p:nvSpPr>
+          <p:cNvPr id="2" name="Slide Image Placeholder 1"/>
+          <p:cNvSpPr>
+            <a:spLocks noGrp="1" noRot="1" noChangeAspect="1"/>
+          </p:cNvSpPr>
+          <p:nvPr>
+            <p:ph type="sldImg"/>
+          </p:nvPr>
+        </p:nvSpPr>
+        <p:spPr>
+          <a:xfrm>
+            <a:off x="381000" y="685800"/>
+            <a:ext cx="6096000" cy="3429000"/>
+          </a:xfrm>
+        </p:spPr>
+      </p:sp>
+      <p:sp>
+        <p:nvSpPr>
+          <p:cNvPr id="3" name="Notes Placeholder 2"/>
+          <p:cNvSpPr>
+            <a:spLocks noGrp="1"/>
+          </p:cNvSpPr>
+          <p:nvPr>
+            <p:ph type="body" idx="1"/>
+          </p:nvPr>
+        </p:nvSpPr>
+        <p:spPr/>
+        <p:txBody>
+          <a:bodyPr/>
+          <a:lstStyle/>
+          <a:p>
+            <a:pPr marL="0" marR="0" lvl="0" indent="0" defTabSz="457200" eaLnBrk="1" fontAlgn="auto" latinLnBrk="0" hangingPunct="1">
+              <a:lnSpc>
+                <a:spcPct val="125000"/>
+              </a:lnSpc>
+              <a:spcBef>
+                <a:spcPts val="0"/>
+              </a:spcBef>
+              <a:spcAft>
+                <a:spcPts val="0"/>
+              </a:spcAft>
+              <a:buClrTx/>
+              <a:buSzTx/>
+              <a:buFontTx/>
+              <a:buNone/>
+              <a:tabLst/>
+              <a:defRPr/>
+            </a:pPr>
+            <a:r>
+              <a:rPr lang="en-US" dirty="0"/>
+              <a:t>2023-07-25: Made this slide for my presentation for Texas DSHS. </a:t>
+            </a:r>
+            <a:r>
+              <a:rPr lang="en-US"/>
+              <a:t>I haven’t actually incorporated it into R4Epi yet.</a:t>
+            </a:r>
+          </a:p>
+          <a:p>
+            <a:endParaRPr lang="en-US" dirty="0"/>
+          </a:p>
+        </p:txBody>
+      </p:sp>
+    </p:spTree>
+    <p:extLst>
+      <p:ext uri="{BB962C8B-B14F-4D97-AF65-F5344CB8AC3E}">
+        <p14:creationId xmlns:p14="http://schemas.microsoft.com/office/powerpoint/2010/main" val="4241640842"/>
+      </p:ext>
+    </p:extLst>
   </p:cSld>
   <p:clrMapOvr>
     <a:masterClrMapping/>
@@ -2719,7 +2999,7 @@
           </a:ln>
           <a:extLst>
             <a:ext uri="{C572A759-6A51-4108-AA02-DFA0A04FC94B}">
-              <ma14:wrappingTextBoxFlag xmlns="" xmlns:m="http://schemas.openxmlformats.org/officeDocument/2006/math" xmlns:a14="http://schemas.microsoft.com/office/drawing/2010/main" xmlns:ma14="http://schemas.microsoft.com/office/mac/drawingml/2011/main" val="1"/>
+              <ma14:wrappingTextBoxFlag xmlns:ma14="http://schemas.microsoft.com/office/mac/drawingml/2011/main" xmlns:a14="http://schemas.microsoft.com/office/drawing/2010/main" xmlns:m="http://schemas.openxmlformats.org/officeDocument/2006/math" xmlns="" val="1"/>
             </a:ext>
           </a:extLst>
         </p:spPr>
@@ -2758,7 +3038,7 @@
           </a:ln>
           <a:extLst>
             <a:ext uri="{C572A759-6A51-4108-AA02-DFA0A04FC94B}">
-              <ma14:wrappingTextBoxFlag xmlns="" xmlns:m="http://schemas.openxmlformats.org/officeDocument/2006/math" xmlns:a14="http://schemas.microsoft.com/office/drawing/2010/main" xmlns:ma14="http://schemas.microsoft.com/office/mac/drawingml/2011/main" val="1"/>
+              <ma14:wrappingTextBoxFlag xmlns:ma14="http://schemas.microsoft.com/office/mac/drawingml/2011/main" xmlns:a14="http://schemas.microsoft.com/office/drawing/2010/main" xmlns:m="http://schemas.openxmlformats.org/officeDocument/2006/math" xmlns="" val="1"/>
             </a:ext>
           </a:extLst>
         </p:spPr>
@@ -3958,7 +4238,7 @@
           </a:prstGeom>
           <a:extLst>
             <a:ext uri="{C572A759-6A51-4108-AA02-DFA0A04FC94B}">
-              <ma14:wrappingTextBoxFlag xmlns:ma14="http://schemas.microsoft.com/office/mac/drawingml/2011/main" xmlns:a14="http://schemas.microsoft.com/office/drawing/2010/main" xmlns:m="http://schemas.openxmlformats.org/officeDocument/2006/math" xmlns="" val="1"/>
+              <ma14:wrappingTextBoxFlag xmlns="" xmlns:m="http://schemas.openxmlformats.org/officeDocument/2006/math" xmlns:a14="http://schemas.microsoft.com/office/drawing/2010/main" xmlns:ma14="http://schemas.microsoft.com/office/mac/drawingml/2011/main" val="1"/>
             </a:ext>
           </a:extLst>
         </p:spPr>
@@ -5042,6 +5322,1193 @@
       </p:grpSpPr>
       <p:grpSp>
         <p:nvGrpSpPr>
+          <p:cNvPr id="62" name="Group 61">
+            <a:extLst>
+              <a:ext uri="{FF2B5EF4-FFF2-40B4-BE49-F238E27FC236}">
+                <a16:creationId xmlns:a16="http://schemas.microsoft.com/office/drawing/2014/main" id="{ED361DBF-85D1-6245-A033-8743FC64CB18}"/>
+              </a:ext>
+            </a:extLst>
+          </p:cNvPr>
+          <p:cNvGrpSpPr/>
+          <p:nvPr/>
+        </p:nvGrpSpPr>
+        <p:grpSpPr>
+          <a:xfrm>
+            <a:off x="67734" y="67734"/>
+            <a:ext cx="5943600" cy="5943600"/>
+            <a:chOff x="130772" y="3886200"/>
+            <a:chExt cx="5943600" cy="5943600"/>
+          </a:xfrm>
+        </p:grpSpPr>
+        <p:sp>
+          <p:nvSpPr>
+            <p:cNvPr id="16" name="Oval 15">
+              <a:extLst>
+                <a:ext uri="{FF2B5EF4-FFF2-40B4-BE49-F238E27FC236}">
+                  <a16:creationId xmlns:a16="http://schemas.microsoft.com/office/drawing/2014/main" id="{04852735-750D-5B46-8AF1-95107CA725D9}"/>
+                </a:ext>
+              </a:extLst>
+            </p:cNvPr>
+            <p:cNvSpPr/>
+            <p:nvPr/>
+          </p:nvSpPr>
+          <p:spPr>
+            <a:xfrm>
+              <a:off x="130772" y="3886200"/>
+              <a:ext cx="5943600" cy="5943600"/>
+            </a:xfrm>
+            <a:prstGeom prst="ellipse">
+              <a:avLst/>
+            </a:prstGeom>
+            <a:noFill/>
+            <a:ln w="28575" cap="flat">
+              <a:solidFill>
+                <a:schemeClr val="accent1">
+                  <a:lumMod val="60000"/>
+                  <a:lumOff val="40000"/>
+                </a:schemeClr>
+              </a:solidFill>
+              <a:miter lim="400000"/>
+            </a:ln>
+            <a:effectLst>
+              <a:outerShdw blurRad="38100" dist="25400" dir="5400000" rotWithShape="0">
+                <a:srgbClr val="000000">
+                  <a:alpha val="50000"/>
+                </a:srgbClr>
+              </a:outerShdw>
+            </a:effectLst>
+            <a:sp3d/>
+          </p:spPr>
+          <p:style>
+            <a:lnRef idx="0">
+              <a:scrgbClr r="0" g="0" b="0"/>
+            </a:lnRef>
+            <a:fillRef idx="0">
+              <a:scrgbClr r="0" g="0" b="0"/>
+            </a:fillRef>
+            <a:effectRef idx="0">
+              <a:scrgbClr r="0" g="0" b="0"/>
+            </a:effectRef>
+            <a:fontRef idx="none"/>
+          </p:style>
+          <p:txBody>
+            <a:bodyPr rot="0" spcFirstLastPara="1" vertOverflow="overflow" horzOverflow="overflow" vert="horz" wrap="square" lIns="50800" tIns="50800" rIns="50800" bIns="50800" numCol="1" spcCol="38100" rtlCol="0" anchor="ctr">
+              <a:spAutoFit/>
+            </a:bodyPr>
+            <a:lstStyle/>
+            <a:p>
+              <a:pPr marL="0" marR="0" indent="0" algn="ctr" defTabSz="825500" rtl="0" fontAlgn="auto" latinLnBrk="0" hangingPunct="0">
+                <a:lnSpc>
+                  <a:spcPct val="100000"/>
+                </a:lnSpc>
+                <a:spcBef>
+                  <a:spcPts val="0"/>
+                </a:spcBef>
+                <a:spcAft>
+                  <a:spcPts val="0"/>
+                </a:spcAft>
+                <a:buClrTx/>
+                <a:buSzTx/>
+                <a:buFontTx/>
+                <a:buNone/>
+                <a:tabLst/>
+              </a:pPr>
+              <a:endParaRPr kumimoji="0" lang="en-US" sz="3200" b="0" i="0" u="none" strike="noStrike" cap="none" spc="0" normalizeH="0" baseline="0">
+                <a:ln>
+                  <a:noFill/>
+                </a:ln>
+                <a:solidFill>
+                  <a:srgbClr val="FFFFFF"/>
+                </a:solidFill>
+                <a:effectLst/>
+                <a:uFillTx/>
+                <a:latin typeface="+mn-lt"/>
+                <a:ea typeface="+mn-ea"/>
+                <a:cs typeface="+mn-cs"/>
+                <a:sym typeface="Helvetica Light"/>
+              </a:endParaRPr>
+            </a:p>
+          </p:txBody>
+        </p:sp>
+        <p:pic>
+          <p:nvPicPr>
+            <p:cNvPr id="19" name="Picture 18" descr="A picture containing star&#10;&#10;Description automatically generated">
+              <a:extLst>
+                <a:ext uri="{FF2B5EF4-FFF2-40B4-BE49-F238E27FC236}">
+                  <a16:creationId xmlns:a16="http://schemas.microsoft.com/office/drawing/2014/main" id="{B9D473A8-9093-A644-9586-DD6783CE7636}"/>
+                </a:ext>
+              </a:extLst>
+            </p:cNvPr>
+            <p:cNvPicPr>
+              <a:picLocks noChangeAspect="1"/>
+            </p:cNvPicPr>
+            <p:nvPr/>
+          </p:nvPicPr>
+          <p:blipFill>
+            <a:blip r:embed="rId3">
+              <a:extLst>
+                <a:ext uri="{28A0092B-C50C-407E-A947-70E740481C1C}">
+                  <a14:useLocalDpi xmlns:a14="http://schemas.microsoft.com/office/drawing/2010/main" val="0"/>
+                </a:ext>
+              </a:extLst>
+            </a:blip>
+            <a:stretch>
+              <a:fillRect/>
+            </a:stretch>
+          </p:blipFill>
+          <p:spPr>
+            <a:xfrm>
+              <a:off x="1178319" y="6178377"/>
+              <a:ext cx="3848506" cy="3063097"/>
+            </a:xfrm>
+            <a:prstGeom prst="rect">
+              <a:avLst/>
+            </a:prstGeom>
+          </p:spPr>
+        </p:pic>
+        <p:sp>
+          <p:nvSpPr>
+            <p:cNvPr id="54" name="TextBox 53">
+              <a:extLst>
+                <a:ext uri="{FF2B5EF4-FFF2-40B4-BE49-F238E27FC236}">
+                  <a16:creationId xmlns:a16="http://schemas.microsoft.com/office/drawing/2014/main" id="{834A4E4F-7F46-A24F-AE96-AE6E63EE4800}"/>
+                </a:ext>
+              </a:extLst>
+            </p:cNvPr>
+            <p:cNvSpPr txBox="1"/>
+            <p:nvPr/>
+          </p:nvSpPr>
+          <p:spPr>
+            <a:xfrm>
+              <a:off x="1619761" y="4750628"/>
+              <a:ext cx="2965622" cy="872034"/>
+            </a:xfrm>
+            <a:prstGeom prst="rect">
+              <a:avLst/>
+            </a:prstGeom>
+            <a:noFill/>
+            <a:ln w="12700" cap="flat">
+              <a:noFill/>
+              <a:miter lim="400000"/>
+            </a:ln>
+            <a:effectLst/>
+            <a:sp3d/>
+          </p:spPr>
+          <p:style>
+            <a:lnRef idx="0">
+              <a:scrgbClr r="0" g="0" b="0"/>
+            </a:lnRef>
+            <a:fillRef idx="0">
+              <a:scrgbClr r="0" g="0" b="0"/>
+            </a:fillRef>
+            <a:effectRef idx="0">
+              <a:scrgbClr r="0" g="0" b="0"/>
+            </a:effectRef>
+            <a:fontRef idx="none"/>
+          </p:style>
+          <p:txBody>
+            <a:bodyPr rot="0" spcFirstLastPara="1" vertOverflow="overflow" horzOverflow="overflow" vert="horz" wrap="square" lIns="50800" tIns="50800" rIns="50800" bIns="50800" numCol="1" spcCol="38100" rtlCol="0" anchor="ctr">
+              <a:spAutoFit/>
+            </a:bodyPr>
+            <a:lstStyle/>
+            <a:p>
+              <a:pPr marL="0" marR="0" indent="0" algn="ctr" defTabSz="825500" rtl="0" fontAlgn="auto" latinLnBrk="0" hangingPunct="0">
+                <a:lnSpc>
+                  <a:spcPct val="100000"/>
+                </a:lnSpc>
+                <a:spcBef>
+                  <a:spcPts val="0"/>
+                </a:spcBef>
+                <a:spcAft>
+                  <a:spcPts val="0"/>
+                </a:spcAft>
+                <a:buClrTx/>
+                <a:buSzTx/>
+                <a:buFontTx/>
+                <a:buNone/>
+                <a:tabLst/>
+              </a:pPr>
+              <a:r>
+                <a:rPr kumimoji="0" lang="en-US" sz="5000" b="0" i="0" u="none" strike="noStrike" cap="none" spc="0" normalizeH="0" baseline="0" dirty="0">
+                  <a:ln>
+                    <a:noFill/>
+                  </a:ln>
+                  <a:solidFill>
+                    <a:srgbClr val="000000"/>
+                  </a:solidFill>
+                  <a:effectLst/>
+                  <a:uFillTx/>
+                  <a:latin typeface="+mn-lt"/>
+                  <a:ea typeface="+mn-ea"/>
+                  <a:cs typeface="+mn-cs"/>
+                  <a:sym typeface="Helvetica Light"/>
+                </a:rPr>
+                <a:t>Transfer</a:t>
+              </a:r>
+            </a:p>
+          </p:txBody>
+        </p:sp>
+      </p:grpSp>
+      <p:grpSp>
+        <p:nvGrpSpPr>
+          <p:cNvPr id="63" name="Group 62">
+            <a:extLst>
+              <a:ext uri="{FF2B5EF4-FFF2-40B4-BE49-F238E27FC236}">
+                <a16:creationId xmlns:a16="http://schemas.microsoft.com/office/drawing/2014/main" id="{65487AEF-A74E-6740-ACEB-3298B35C8E85}"/>
+              </a:ext>
+            </a:extLst>
+          </p:cNvPr>
+          <p:cNvGrpSpPr/>
+          <p:nvPr/>
+        </p:nvGrpSpPr>
+        <p:grpSpPr>
+          <a:xfrm>
+            <a:off x="9220200" y="67734"/>
+            <a:ext cx="5943600" cy="6060988"/>
+            <a:chOff x="6182153" y="3886200"/>
+            <a:chExt cx="5943600" cy="6060988"/>
+          </a:xfrm>
+        </p:grpSpPr>
+        <p:sp>
+          <p:nvSpPr>
+            <p:cNvPr id="6" name="Oval 5">
+              <a:extLst>
+                <a:ext uri="{FF2B5EF4-FFF2-40B4-BE49-F238E27FC236}">
+                  <a16:creationId xmlns:a16="http://schemas.microsoft.com/office/drawing/2014/main" id="{6DFBA26D-CF56-164C-B35F-9B12059BDCB3}"/>
+                </a:ext>
+              </a:extLst>
+            </p:cNvPr>
+            <p:cNvSpPr/>
+            <p:nvPr/>
+          </p:nvSpPr>
+          <p:spPr>
+            <a:xfrm>
+              <a:off x="6182153" y="3886200"/>
+              <a:ext cx="5943600" cy="5943600"/>
+            </a:xfrm>
+            <a:prstGeom prst="ellipse">
+              <a:avLst/>
+            </a:prstGeom>
+            <a:noFill/>
+            <a:ln w="28575" cap="flat">
+              <a:solidFill>
+                <a:schemeClr val="accent5">
+                  <a:lumMod val="60000"/>
+                  <a:lumOff val="40000"/>
+                </a:schemeClr>
+              </a:solidFill>
+              <a:miter lim="400000"/>
+            </a:ln>
+            <a:effectLst>
+              <a:outerShdw blurRad="38100" dist="25400" dir="5400000" rotWithShape="0">
+                <a:srgbClr val="000000">
+                  <a:alpha val="50000"/>
+                </a:srgbClr>
+              </a:outerShdw>
+            </a:effectLst>
+            <a:sp3d/>
+          </p:spPr>
+          <p:style>
+            <a:lnRef idx="0">
+              <a:scrgbClr r="0" g="0" b="0"/>
+            </a:lnRef>
+            <a:fillRef idx="0">
+              <a:scrgbClr r="0" g="0" b="0"/>
+            </a:fillRef>
+            <a:effectRef idx="0">
+              <a:scrgbClr r="0" g="0" b="0"/>
+            </a:effectRef>
+            <a:fontRef idx="none"/>
+          </p:style>
+          <p:txBody>
+            <a:bodyPr rot="0" spcFirstLastPara="1" vertOverflow="overflow" horzOverflow="overflow" vert="horz" wrap="square" lIns="50800" tIns="50800" rIns="50800" bIns="50800" numCol="1" spcCol="38100" rtlCol="0" anchor="ctr">
+              <a:spAutoFit/>
+            </a:bodyPr>
+            <a:lstStyle/>
+            <a:p>
+              <a:pPr marL="0" marR="0" indent="0" algn="ctr" defTabSz="825500" rtl="0" fontAlgn="auto" latinLnBrk="0" hangingPunct="0">
+                <a:lnSpc>
+                  <a:spcPct val="100000"/>
+                </a:lnSpc>
+                <a:spcBef>
+                  <a:spcPts val="0"/>
+                </a:spcBef>
+                <a:spcAft>
+                  <a:spcPts val="0"/>
+                </a:spcAft>
+                <a:buClrTx/>
+                <a:buSzTx/>
+                <a:buFontTx/>
+                <a:buNone/>
+                <a:tabLst/>
+              </a:pPr>
+              <a:endParaRPr kumimoji="0" lang="en-US" sz="3200" b="0" i="0" u="none" strike="noStrike" cap="none" spc="0" normalizeH="0" baseline="0">
+                <a:ln>
+                  <a:noFill/>
+                </a:ln>
+                <a:solidFill>
+                  <a:srgbClr val="FFFFFF"/>
+                </a:solidFill>
+                <a:effectLst/>
+                <a:uFillTx/>
+                <a:latin typeface="+mn-lt"/>
+                <a:ea typeface="+mn-ea"/>
+                <a:cs typeface="+mn-cs"/>
+                <a:sym typeface="Helvetica Light"/>
+              </a:endParaRPr>
+            </a:p>
+          </p:txBody>
+        </p:sp>
+        <p:pic>
+          <p:nvPicPr>
+            <p:cNvPr id="45" name="Picture 44" descr="A close up of a logo&#10;&#10;Description automatically generated">
+              <a:extLst>
+                <a:ext uri="{FF2B5EF4-FFF2-40B4-BE49-F238E27FC236}">
+                  <a16:creationId xmlns:a16="http://schemas.microsoft.com/office/drawing/2014/main" id="{9A626F3D-9EFC-5143-AB60-48E6F1919474}"/>
+                </a:ext>
+              </a:extLst>
+            </p:cNvPr>
+            <p:cNvPicPr>
+              <a:picLocks noChangeAspect="1"/>
+            </p:cNvPicPr>
+            <p:nvPr/>
+          </p:nvPicPr>
+          <p:blipFill>
+            <a:blip r:embed="rId4">
+              <a:extLst>
+                <a:ext uri="{BEBA8EAE-BF5A-486C-A8C5-ECC9F3942E4B}">
+                  <a14:imgProps xmlns:a14="http://schemas.microsoft.com/office/drawing/2010/main">
+                    <a14:imgLayer r:embed="rId5">
+                      <a14:imgEffect>
+                        <a14:backgroundRemoval t="10000" b="90000" l="10000" r="90000">
+                          <a14:foregroundMark x1="39800" y1="55000" x2="39800" y2="55000"/>
+                          <a14:foregroundMark x1="45800" y1="45741" x2="45800" y2="45741"/>
+                          <a14:foregroundMark x1="56000" y1="40000" x2="56000" y2="40000"/>
+                          <a14:foregroundMark x1="64100" y1="52963" x2="64100" y2="52963"/>
+                        </a14:backgroundRemoval>
+                      </a14:imgEffect>
+                    </a14:imgLayer>
+                  </a14:imgProps>
+                </a:ext>
+                <a:ext uri="{28A0092B-C50C-407E-A947-70E740481C1C}">
+                  <a14:useLocalDpi xmlns:a14="http://schemas.microsoft.com/office/drawing/2010/main" val="0"/>
+                </a:ext>
+              </a:extLst>
+            </a:blip>
+            <a:stretch>
+              <a:fillRect/>
+            </a:stretch>
+          </p:blipFill>
+          <p:spPr>
+            <a:xfrm>
+              <a:off x="7121919" y="5472662"/>
+              <a:ext cx="4143080" cy="4474526"/>
+            </a:xfrm>
+            <a:prstGeom prst="rect">
+              <a:avLst/>
+            </a:prstGeom>
+          </p:spPr>
+        </p:pic>
+        <p:sp>
+          <p:nvSpPr>
+            <p:cNvPr id="55" name="TextBox 54">
+              <a:extLst>
+                <a:ext uri="{FF2B5EF4-FFF2-40B4-BE49-F238E27FC236}">
+                  <a16:creationId xmlns:a16="http://schemas.microsoft.com/office/drawing/2014/main" id="{229B3398-C401-F646-BF95-CEC401C24114}"/>
+                </a:ext>
+              </a:extLst>
+            </p:cNvPr>
+            <p:cNvSpPr txBox="1"/>
+            <p:nvPr/>
+          </p:nvSpPr>
+          <p:spPr>
+            <a:xfrm>
+              <a:off x="7928457" y="4750628"/>
+              <a:ext cx="2450992" cy="872034"/>
+            </a:xfrm>
+            <a:prstGeom prst="rect">
+              <a:avLst/>
+            </a:prstGeom>
+            <a:noFill/>
+            <a:ln w="12700" cap="flat">
+              <a:noFill/>
+              <a:miter lim="400000"/>
+            </a:ln>
+            <a:effectLst/>
+            <a:sp3d/>
+          </p:spPr>
+          <p:style>
+            <a:lnRef idx="0">
+              <a:scrgbClr r="0" g="0" b="0"/>
+            </a:lnRef>
+            <a:fillRef idx="0">
+              <a:scrgbClr r="0" g="0" b="0"/>
+            </a:fillRef>
+            <a:effectRef idx="0">
+              <a:scrgbClr r="0" g="0" b="0"/>
+            </a:effectRef>
+            <a:fontRef idx="none"/>
+          </p:style>
+          <p:txBody>
+            <a:bodyPr rot="0" spcFirstLastPara="1" vertOverflow="overflow" horzOverflow="overflow" vert="horz" wrap="none" lIns="50800" tIns="50800" rIns="50800" bIns="50800" numCol="1" spcCol="38100" rtlCol="0" anchor="ctr">
+              <a:spAutoFit/>
+            </a:bodyPr>
+            <a:lstStyle/>
+            <a:p>
+              <a:pPr marL="0" marR="0" indent="0" algn="ctr" defTabSz="825500" rtl="0" fontAlgn="auto" latinLnBrk="0" hangingPunct="0">
+                <a:lnSpc>
+                  <a:spcPct val="100000"/>
+                </a:lnSpc>
+                <a:spcBef>
+                  <a:spcPts val="0"/>
+                </a:spcBef>
+                <a:spcAft>
+                  <a:spcPts val="0"/>
+                </a:spcAft>
+                <a:buClrTx/>
+                <a:buSzTx/>
+                <a:buFontTx/>
+                <a:buNone/>
+                <a:tabLst/>
+              </a:pPr>
+              <a:r>
+                <a:rPr kumimoji="0" lang="en-US" sz="5000" b="0" i="0" u="none" strike="noStrike" cap="none" spc="0" normalizeH="0" baseline="0" dirty="0">
+                  <a:ln>
+                    <a:noFill/>
+                  </a:ln>
+                  <a:solidFill>
+                    <a:srgbClr val="000000"/>
+                  </a:solidFill>
+                  <a:effectLst/>
+                  <a:uFillTx/>
+                  <a:latin typeface="+mn-lt"/>
+                  <a:ea typeface="+mn-ea"/>
+                  <a:cs typeface="+mn-cs"/>
+                  <a:sym typeface="Helvetica Light"/>
+                </a:rPr>
+                <a:t>Manage</a:t>
+              </a:r>
+            </a:p>
+          </p:txBody>
+        </p:sp>
+      </p:grpSp>
+      <p:grpSp>
+        <p:nvGrpSpPr>
+          <p:cNvPr id="128" name="Group 127">
+            <a:extLst>
+              <a:ext uri="{FF2B5EF4-FFF2-40B4-BE49-F238E27FC236}">
+                <a16:creationId xmlns:a16="http://schemas.microsoft.com/office/drawing/2014/main" id="{927492ED-E8B3-F340-A61C-2B8885DEE43D}"/>
+              </a:ext>
+            </a:extLst>
+          </p:cNvPr>
+          <p:cNvGrpSpPr/>
+          <p:nvPr/>
+        </p:nvGrpSpPr>
+        <p:grpSpPr>
+          <a:xfrm>
+            <a:off x="18372666" y="67734"/>
+            <a:ext cx="5943600" cy="5943600"/>
+            <a:chOff x="12233534" y="3886200"/>
+            <a:chExt cx="5943600" cy="5943600"/>
+          </a:xfrm>
+        </p:grpSpPr>
+        <p:sp>
+          <p:nvSpPr>
+            <p:cNvPr id="17" name="Oval 16">
+              <a:extLst>
+                <a:ext uri="{FF2B5EF4-FFF2-40B4-BE49-F238E27FC236}">
+                  <a16:creationId xmlns:a16="http://schemas.microsoft.com/office/drawing/2014/main" id="{F9AAC136-CE2D-5E4C-BD8D-7E504DD00537}"/>
+                </a:ext>
+              </a:extLst>
+            </p:cNvPr>
+            <p:cNvSpPr/>
+            <p:nvPr/>
+          </p:nvSpPr>
+          <p:spPr>
+            <a:xfrm>
+              <a:off x="12233534" y="3886200"/>
+              <a:ext cx="5943600" cy="5943600"/>
+            </a:xfrm>
+            <a:prstGeom prst="ellipse">
+              <a:avLst/>
+            </a:prstGeom>
+            <a:noFill/>
+            <a:ln w="28575" cap="flat">
+              <a:solidFill>
+                <a:schemeClr val="accent2">
+                  <a:lumMod val="60000"/>
+                  <a:lumOff val="40000"/>
+                </a:schemeClr>
+              </a:solidFill>
+              <a:miter lim="400000"/>
+            </a:ln>
+            <a:effectLst>
+              <a:outerShdw blurRad="38100" dist="25400" dir="5400000" rotWithShape="0">
+                <a:srgbClr val="000000">
+                  <a:alpha val="50000"/>
+                </a:srgbClr>
+              </a:outerShdw>
+            </a:effectLst>
+            <a:sp3d/>
+          </p:spPr>
+          <p:style>
+            <a:lnRef idx="0">
+              <a:scrgbClr r="0" g="0" b="0"/>
+            </a:lnRef>
+            <a:fillRef idx="0">
+              <a:scrgbClr r="0" g="0" b="0"/>
+            </a:fillRef>
+            <a:effectRef idx="0">
+              <a:scrgbClr r="0" g="0" b="0"/>
+            </a:effectRef>
+            <a:fontRef idx="none"/>
+          </p:style>
+          <p:txBody>
+            <a:bodyPr rot="0" spcFirstLastPara="1" vertOverflow="overflow" horzOverflow="overflow" vert="horz" wrap="square" lIns="50800" tIns="50800" rIns="50800" bIns="50800" numCol="1" spcCol="38100" rtlCol="0" anchor="ctr">
+              <a:spAutoFit/>
+            </a:bodyPr>
+            <a:lstStyle/>
+            <a:p>
+              <a:pPr marL="0" marR="0" indent="0" algn="ctr" defTabSz="825500" rtl="0" fontAlgn="auto" latinLnBrk="0" hangingPunct="0">
+                <a:lnSpc>
+                  <a:spcPct val="100000"/>
+                </a:lnSpc>
+                <a:spcBef>
+                  <a:spcPts val="0"/>
+                </a:spcBef>
+                <a:spcAft>
+                  <a:spcPts val="0"/>
+                </a:spcAft>
+                <a:buClrTx/>
+                <a:buSzTx/>
+                <a:buFontTx/>
+                <a:buNone/>
+                <a:tabLst/>
+              </a:pPr>
+              <a:endParaRPr kumimoji="0" lang="en-US" sz="3200" b="0" i="0" u="none" strike="noStrike" cap="none" spc="0" normalizeH="0" baseline="0">
+                <a:ln>
+                  <a:noFill/>
+                </a:ln>
+                <a:solidFill>
+                  <a:srgbClr val="FFFFFF"/>
+                </a:solidFill>
+                <a:effectLst/>
+                <a:uFillTx/>
+                <a:latin typeface="+mn-lt"/>
+                <a:ea typeface="+mn-ea"/>
+                <a:cs typeface="+mn-cs"/>
+                <a:sym typeface="Helvetica Light"/>
+              </a:endParaRPr>
+            </a:p>
+          </p:txBody>
+        </p:sp>
+        <p:pic>
+          <p:nvPicPr>
+            <p:cNvPr id="49" name="Picture 48" descr="A picture containing drawing&#10;&#10;Description automatically generated">
+              <a:extLst>
+                <a:ext uri="{FF2B5EF4-FFF2-40B4-BE49-F238E27FC236}">
+                  <a16:creationId xmlns:a16="http://schemas.microsoft.com/office/drawing/2014/main" id="{29934E66-BECE-2447-8162-CC613485C71A}"/>
+                </a:ext>
+              </a:extLst>
+            </p:cNvPr>
+            <p:cNvPicPr>
+              <a:picLocks noChangeAspect="1"/>
+            </p:cNvPicPr>
+            <p:nvPr/>
+          </p:nvPicPr>
+          <p:blipFill>
+            <a:blip r:embed="rId6">
+              <a:extLst>
+                <a:ext uri="{28A0092B-C50C-407E-A947-70E740481C1C}">
+                  <a14:useLocalDpi xmlns:a14="http://schemas.microsoft.com/office/drawing/2010/main" val="0"/>
+                </a:ext>
+              </a:extLst>
+            </a:blip>
+            <a:stretch>
+              <a:fillRect/>
+            </a:stretch>
+          </p:blipFill>
+          <p:spPr>
+            <a:xfrm>
+              <a:off x="13319902" y="5622662"/>
+              <a:ext cx="3618812" cy="3618812"/>
+            </a:xfrm>
+            <a:prstGeom prst="rect">
+              <a:avLst/>
+            </a:prstGeom>
+          </p:spPr>
+        </p:pic>
+        <p:sp>
+          <p:nvSpPr>
+            <p:cNvPr id="56" name="TextBox 55">
+              <a:extLst>
+                <a:ext uri="{FF2B5EF4-FFF2-40B4-BE49-F238E27FC236}">
+                  <a16:creationId xmlns:a16="http://schemas.microsoft.com/office/drawing/2014/main" id="{61525C38-0352-A94E-A056-1B7C5CD5A256}"/>
+                </a:ext>
+              </a:extLst>
+            </p:cNvPr>
+            <p:cNvSpPr txBox="1"/>
+            <p:nvPr/>
+          </p:nvSpPr>
+          <p:spPr>
+            <a:xfrm>
+              <a:off x="14014302" y="4600628"/>
+              <a:ext cx="2382063" cy="872034"/>
+            </a:xfrm>
+            <a:prstGeom prst="rect">
+              <a:avLst/>
+            </a:prstGeom>
+            <a:noFill/>
+            <a:ln w="12700" cap="flat">
+              <a:noFill/>
+              <a:miter lim="400000"/>
+            </a:ln>
+            <a:effectLst/>
+            <a:sp3d/>
+          </p:spPr>
+          <p:style>
+            <a:lnRef idx="0">
+              <a:scrgbClr r="0" g="0" b="0"/>
+            </a:lnRef>
+            <a:fillRef idx="0">
+              <a:scrgbClr r="0" g="0" b="0"/>
+            </a:fillRef>
+            <a:effectRef idx="0">
+              <a:scrgbClr r="0" g="0" b="0"/>
+            </a:effectRef>
+            <a:fontRef idx="none"/>
+          </p:style>
+          <p:txBody>
+            <a:bodyPr rot="0" spcFirstLastPara="1" vertOverflow="overflow" horzOverflow="overflow" vert="horz" wrap="none" lIns="50800" tIns="50800" rIns="50800" bIns="50800" numCol="1" spcCol="38100" rtlCol="0" anchor="ctr">
+              <a:spAutoFit/>
+            </a:bodyPr>
+            <a:lstStyle/>
+            <a:p>
+              <a:pPr marL="0" marR="0" indent="0" algn="ctr" defTabSz="825500" rtl="0" fontAlgn="auto" latinLnBrk="0" hangingPunct="0">
+                <a:lnSpc>
+                  <a:spcPct val="100000"/>
+                </a:lnSpc>
+                <a:spcBef>
+                  <a:spcPts val="0"/>
+                </a:spcBef>
+                <a:spcAft>
+                  <a:spcPts val="0"/>
+                </a:spcAft>
+                <a:buClrTx/>
+                <a:buSzTx/>
+                <a:buFontTx/>
+                <a:buNone/>
+                <a:tabLst/>
+              </a:pPr>
+              <a:r>
+                <a:rPr kumimoji="0" lang="en-US" sz="5000" b="0" i="0" u="none" strike="noStrike" cap="none" spc="0" normalizeH="0" baseline="0" dirty="0">
+                  <a:ln>
+                    <a:noFill/>
+                  </a:ln>
+                  <a:solidFill>
+                    <a:srgbClr val="000000"/>
+                  </a:solidFill>
+                  <a:effectLst/>
+                  <a:uFillTx/>
+                  <a:latin typeface="+mn-lt"/>
+                  <a:ea typeface="+mn-ea"/>
+                  <a:cs typeface="+mn-cs"/>
+                  <a:sym typeface="Helvetica Light"/>
+                </a:rPr>
+                <a:t>Analyze</a:t>
+              </a:r>
+            </a:p>
+          </p:txBody>
+        </p:sp>
+      </p:grpSp>
+      <p:grpSp>
+        <p:nvGrpSpPr>
+          <p:cNvPr id="23" name="Group 22">
+            <a:extLst>
+              <a:ext uri="{FF2B5EF4-FFF2-40B4-BE49-F238E27FC236}">
+                <a16:creationId xmlns:a16="http://schemas.microsoft.com/office/drawing/2014/main" id="{E24DE934-896F-70D3-B1FB-980A7055C3BD}"/>
+              </a:ext>
+            </a:extLst>
+          </p:cNvPr>
+          <p:cNvGrpSpPr/>
+          <p:nvPr/>
+        </p:nvGrpSpPr>
+        <p:grpSpPr>
+          <a:xfrm>
+            <a:off x="13830300" y="7730052"/>
+            <a:ext cx="5943600" cy="5943600"/>
+            <a:chOff x="13830300" y="7797786"/>
+            <a:chExt cx="5943600" cy="5943600"/>
+          </a:xfrm>
+        </p:grpSpPr>
+        <p:pic>
+          <p:nvPicPr>
+            <p:cNvPr id="14" name="Picture 13" descr="A black and white image of a set of knobs&#10;&#10;Description automatically generated">
+              <a:extLst>
+                <a:ext uri="{FF2B5EF4-FFF2-40B4-BE49-F238E27FC236}">
+                  <a16:creationId xmlns:a16="http://schemas.microsoft.com/office/drawing/2014/main" id="{1A6DB266-3AC9-0C84-E50B-77F2BD6EB7CE}"/>
+                </a:ext>
+              </a:extLst>
+            </p:cNvPr>
+            <p:cNvPicPr>
+              <a:picLocks noChangeAspect="1"/>
+            </p:cNvPicPr>
+            <p:nvPr/>
+          </p:nvPicPr>
+          <p:blipFill>
+            <a:blip r:embed="rId7">
+              <a:extLst>
+                <a:ext uri="{28A0092B-C50C-407E-A947-70E740481C1C}">
+                  <a14:useLocalDpi xmlns:a14="http://schemas.microsoft.com/office/drawing/2010/main" val="0"/>
+                </a:ext>
+              </a:extLst>
+            </a:blip>
+            <a:stretch>
+              <a:fillRect/>
+            </a:stretch>
+          </p:blipFill>
+          <p:spPr>
+            <a:xfrm>
+              <a:off x="15289947" y="10089962"/>
+              <a:ext cx="3018641" cy="3018641"/>
+            </a:xfrm>
+            <a:prstGeom prst="rect">
+              <a:avLst/>
+            </a:prstGeom>
+          </p:spPr>
+        </p:pic>
+        <p:sp>
+          <p:nvSpPr>
+            <p:cNvPr id="18" name="Oval 17">
+              <a:extLst>
+                <a:ext uri="{FF2B5EF4-FFF2-40B4-BE49-F238E27FC236}">
+                  <a16:creationId xmlns:a16="http://schemas.microsoft.com/office/drawing/2014/main" id="{F47AFA74-82AA-324F-87B3-3A2163069F4D}"/>
+                </a:ext>
+              </a:extLst>
+            </p:cNvPr>
+            <p:cNvSpPr/>
+            <p:nvPr/>
+          </p:nvSpPr>
+          <p:spPr>
+            <a:xfrm>
+              <a:off x="13830300" y="7797786"/>
+              <a:ext cx="5943600" cy="5943600"/>
+            </a:xfrm>
+            <a:prstGeom prst="ellipse">
+              <a:avLst/>
+            </a:prstGeom>
+            <a:noFill/>
+            <a:ln w="28575" cap="flat">
+              <a:solidFill>
+                <a:schemeClr val="accent3"/>
+              </a:solidFill>
+              <a:miter lim="400000"/>
+            </a:ln>
+            <a:effectLst>
+              <a:outerShdw blurRad="38100" dist="25400" dir="5400000" rotWithShape="0">
+                <a:srgbClr val="000000">
+                  <a:alpha val="50000"/>
+                </a:srgbClr>
+              </a:outerShdw>
+            </a:effectLst>
+            <a:sp3d/>
+          </p:spPr>
+          <p:style>
+            <a:lnRef idx="0">
+              <a:scrgbClr r="0" g="0" b="0"/>
+            </a:lnRef>
+            <a:fillRef idx="0">
+              <a:scrgbClr r="0" g="0" b="0"/>
+            </a:fillRef>
+            <a:effectRef idx="0">
+              <a:scrgbClr r="0" g="0" b="0"/>
+            </a:effectRef>
+            <a:fontRef idx="none"/>
+          </p:style>
+          <p:txBody>
+            <a:bodyPr rot="0" spcFirstLastPara="1" vertOverflow="overflow" horzOverflow="overflow" vert="horz" wrap="square" lIns="50800" tIns="50800" rIns="50800" bIns="50800" numCol="1" spcCol="38100" rtlCol="0" anchor="ctr">
+              <a:spAutoFit/>
+            </a:bodyPr>
+            <a:lstStyle/>
+            <a:p>
+              <a:pPr marL="0" marR="0" indent="0" algn="ctr" defTabSz="825500" rtl="0" fontAlgn="auto" latinLnBrk="0" hangingPunct="0">
+                <a:lnSpc>
+                  <a:spcPct val="100000"/>
+                </a:lnSpc>
+                <a:spcBef>
+                  <a:spcPts val="0"/>
+                </a:spcBef>
+                <a:spcAft>
+                  <a:spcPts val="0"/>
+                </a:spcAft>
+                <a:buClrTx/>
+                <a:buSzTx/>
+                <a:buFontTx/>
+                <a:buNone/>
+                <a:tabLst/>
+              </a:pPr>
+              <a:endParaRPr kumimoji="0" lang="en-US" sz="3200" b="0" i="0" u="none" strike="noStrike" cap="none" spc="0" normalizeH="0" baseline="0">
+                <a:ln>
+                  <a:noFill/>
+                </a:ln>
+                <a:solidFill>
+                  <a:srgbClr val="FFFFFF"/>
+                </a:solidFill>
+                <a:effectLst/>
+                <a:uFillTx/>
+                <a:latin typeface="+mn-lt"/>
+                <a:ea typeface="+mn-ea"/>
+                <a:cs typeface="+mn-cs"/>
+                <a:sym typeface="Helvetica Light"/>
+              </a:endParaRPr>
+            </a:p>
+          </p:txBody>
+        </p:sp>
+        <p:sp>
+          <p:nvSpPr>
+            <p:cNvPr id="57" name="TextBox 56">
+              <a:extLst>
+                <a:ext uri="{FF2B5EF4-FFF2-40B4-BE49-F238E27FC236}">
+                  <a16:creationId xmlns:a16="http://schemas.microsoft.com/office/drawing/2014/main" id="{904D8A54-3D1F-FD45-8A6C-D87102CCAA1D}"/>
+                </a:ext>
+              </a:extLst>
+            </p:cNvPr>
+            <p:cNvSpPr txBox="1"/>
+            <p:nvPr/>
+          </p:nvSpPr>
+          <p:spPr>
+            <a:xfrm>
+              <a:off x="15662739" y="8507858"/>
+              <a:ext cx="2273059" cy="872034"/>
+            </a:xfrm>
+            <a:prstGeom prst="rect">
+              <a:avLst/>
+            </a:prstGeom>
+            <a:noFill/>
+            <a:ln w="12700" cap="flat">
+              <a:noFill/>
+              <a:miter lim="400000"/>
+            </a:ln>
+            <a:effectLst/>
+            <a:sp3d/>
+          </p:spPr>
+          <p:style>
+            <a:lnRef idx="0">
+              <a:scrgbClr r="0" g="0" b="0"/>
+            </a:lnRef>
+            <a:fillRef idx="0">
+              <a:scrgbClr r="0" g="0" b="0"/>
+            </a:fillRef>
+            <a:effectRef idx="0">
+              <a:scrgbClr r="0" g="0" b="0"/>
+            </a:effectRef>
+            <a:fontRef idx="none"/>
+          </p:style>
+          <p:txBody>
+            <a:bodyPr rot="0" spcFirstLastPara="1" vertOverflow="overflow" horzOverflow="overflow" vert="horz" wrap="none" lIns="50800" tIns="50800" rIns="50800" bIns="50800" numCol="1" spcCol="38100" rtlCol="0" anchor="ctr">
+              <a:spAutoFit/>
+            </a:bodyPr>
+            <a:lstStyle/>
+            <a:p>
+              <a:pPr marL="0" marR="0" indent="0" algn="ctr" defTabSz="825500" rtl="0" fontAlgn="auto" latinLnBrk="0" hangingPunct="0">
+                <a:lnSpc>
+                  <a:spcPct val="100000"/>
+                </a:lnSpc>
+                <a:spcBef>
+                  <a:spcPts val="0"/>
+                </a:spcBef>
+                <a:spcAft>
+                  <a:spcPts val="0"/>
+                </a:spcAft>
+                <a:buClrTx/>
+                <a:buSzTx/>
+                <a:buFontTx/>
+                <a:buNone/>
+                <a:tabLst/>
+              </a:pPr>
+              <a:r>
+                <a:rPr kumimoji="0" lang="en-US" sz="5000" b="0" i="0" u="none" strike="noStrike" cap="none" spc="0" normalizeH="0" baseline="0" dirty="0">
+                  <a:ln>
+                    <a:noFill/>
+                  </a:ln>
+                  <a:solidFill>
+                    <a:srgbClr val="000000"/>
+                  </a:solidFill>
+                  <a:effectLst/>
+                  <a:uFillTx/>
+                  <a:latin typeface="+mn-lt"/>
+                  <a:ea typeface="+mn-ea"/>
+                  <a:cs typeface="+mn-cs"/>
+                  <a:sym typeface="Helvetica Light"/>
+                </a:rPr>
+                <a:t>Interact</a:t>
+              </a:r>
+            </a:p>
+          </p:txBody>
+        </p:sp>
+      </p:grpSp>
+      <p:grpSp>
+        <p:nvGrpSpPr>
+          <p:cNvPr id="2" name="Group 1">
+            <a:extLst>
+              <a:ext uri="{FF2B5EF4-FFF2-40B4-BE49-F238E27FC236}">
+                <a16:creationId xmlns:a16="http://schemas.microsoft.com/office/drawing/2014/main" id="{2B4502AB-16AD-EE87-8929-629E65F591EB}"/>
+              </a:ext>
+            </a:extLst>
+          </p:cNvPr>
+          <p:cNvGrpSpPr/>
+          <p:nvPr/>
+        </p:nvGrpSpPr>
+        <p:grpSpPr>
+          <a:xfrm>
+            <a:off x="4584700" y="7730052"/>
+            <a:ext cx="5943600" cy="5943600"/>
+            <a:chOff x="18284914" y="3886200"/>
+            <a:chExt cx="5943600" cy="5943600"/>
+          </a:xfrm>
+        </p:grpSpPr>
+        <p:sp>
+          <p:nvSpPr>
+            <p:cNvPr id="3" name="Oval 2">
+              <a:extLst>
+                <a:ext uri="{FF2B5EF4-FFF2-40B4-BE49-F238E27FC236}">
+                  <a16:creationId xmlns:a16="http://schemas.microsoft.com/office/drawing/2014/main" id="{28585A01-403D-33C6-9946-8DF2B44CFA41}"/>
+                </a:ext>
+              </a:extLst>
+            </p:cNvPr>
+            <p:cNvSpPr/>
+            <p:nvPr/>
+          </p:nvSpPr>
+          <p:spPr>
+            <a:xfrm>
+              <a:off x="18284914" y="3886200"/>
+              <a:ext cx="5943600" cy="5943600"/>
+            </a:xfrm>
+            <a:prstGeom prst="ellipse">
+              <a:avLst/>
+            </a:prstGeom>
+            <a:noFill/>
+            <a:ln w="28575" cap="flat">
+              <a:solidFill>
+                <a:schemeClr val="accent6">
+                  <a:lumMod val="60000"/>
+                  <a:lumOff val="40000"/>
+                </a:schemeClr>
+              </a:solidFill>
+              <a:miter lim="400000"/>
+            </a:ln>
+            <a:effectLst>
+              <a:outerShdw blurRad="38100" dist="25400" dir="5400000" rotWithShape="0">
+                <a:srgbClr val="000000">
+                  <a:alpha val="50000"/>
+                </a:srgbClr>
+              </a:outerShdw>
+            </a:effectLst>
+            <a:sp3d/>
+          </p:spPr>
+          <p:style>
+            <a:lnRef idx="0">
+              <a:scrgbClr r="0" g="0" b="0"/>
+            </a:lnRef>
+            <a:fillRef idx="0">
+              <a:scrgbClr r="0" g="0" b="0"/>
+            </a:fillRef>
+            <a:effectRef idx="0">
+              <a:scrgbClr r="0" g="0" b="0"/>
+            </a:effectRef>
+            <a:fontRef idx="none"/>
+          </p:style>
+          <p:txBody>
+            <a:bodyPr rot="0" spcFirstLastPara="1" vertOverflow="overflow" horzOverflow="overflow" vert="horz" wrap="square" lIns="50800" tIns="50800" rIns="50800" bIns="50800" numCol="1" spcCol="38100" rtlCol="0" anchor="ctr">
+              <a:spAutoFit/>
+            </a:bodyPr>
+            <a:lstStyle/>
+            <a:p>
+              <a:pPr marL="0" marR="0" indent="0" algn="ctr" defTabSz="825500" rtl="0" fontAlgn="auto" latinLnBrk="0" hangingPunct="0">
+                <a:lnSpc>
+                  <a:spcPct val="100000"/>
+                </a:lnSpc>
+                <a:spcBef>
+                  <a:spcPts val="0"/>
+                </a:spcBef>
+                <a:spcAft>
+                  <a:spcPts val="0"/>
+                </a:spcAft>
+                <a:buClrTx/>
+                <a:buSzTx/>
+                <a:buFontTx/>
+                <a:buNone/>
+                <a:tabLst/>
+              </a:pPr>
+              <a:endParaRPr kumimoji="0" lang="en-US" sz="3200" b="0" i="0" u="none" strike="noStrike" cap="none" spc="0" normalizeH="0" baseline="0">
+                <a:ln>
+                  <a:noFill/>
+                </a:ln>
+                <a:solidFill>
+                  <a:srgbClr val="FFFFFF"/>
+                </a:solidFill>
+                <a:effectLst/>
+                <a:uFillTx/>
+                <a:latin typeface="+mn-lt"/>
+                <a:ea typeface="+mn-ea"/>
+                <a:cs typeface="+mn-cs"/>
+                <a:sym typeface="Helvetica Light"/>
+              </a:endParaRPr>
+            </a:p>
+          </p:txBody>
+        </p:sp>
+        <p:pic>
+          <p:nvPicPr>
+            <p:cNvPr id="4" name="Picture 3" descr="A picture containing drawing&#10;&#10;Description automatically generated">
+              <a:extLst>
+                <a:ext uri="{FF2B5EF4-FFF2-40B4-BE49-F238E27FC236}">
+                  <a16:creationId xmlns:a16="http://schemas.microsoft.com/office/drawing/2014/main" id="{F82D769F-2451-7086-41D8-3D6DEFADD351}"/>
+                </a:ext>
+              </a:extLst>
+            </p:cNvPr>
+            <p:cNvPicPr>
+              <a:picLocks noChangeAspect="1"/>
+            </p:cNvPicPr>
+            <p:nvPr/>
+          </p:nvPicPr>
+          <p:blipFill>
+            <a:blip r:embed="rId8">
+              <a:extLst>
+                <a:ext uri="{28A0092B-C50C-407E-A947-70E740481C1C}">
+                  <a14:useLocalDpi xmlns:a14="http://schemas.microsoft.com/office/drawing/2010/main" val="0"/>
+                </a:ext>
+              </a:extLst>
+            </a:blip>
+            <a:stretch>
+              <a:fillRect/>
+            </a:stretch>
+          </p:blipFill>
+          <p:spPr>
+            <a:xfrm>
+              <a:off x="19994062" y="6178377"/>
+              <a:ext cx="2519641" cy="3018641"/>
+            </a:xfrm>
+            <a:prstGeom prst="rect">
+              <a:avLst/>
+            </a:prstGeom>
+          </p:spPr>
+        </p:pic>
+        <p:sp>
+          <p:nvSpPr>
+            <p:cNvPr id="5" name="TextBox 4">
+              <a:extLst>
+                <a:ext uri="{FF2B5EF4-FFF2-40B4-BE49-F238E27FC236}">
+                  <a16:creationId xmlns:a16="http://schemas.microsoft.com/office/drawing/2014/main" id="{C13C5698-CD03-DFEF-A9F9-6D8E54C7804B}"/>
+                </a:ext>
+              </a:extLst>
+            </p:cNvPr>
+            <p:cNvSpPr txBox="1"/>
+            <p:nvPr/>
+          </p:nvSpPr>
+          <p:spPr>
+            <a:xfrm>
+              <a:off x="20117352" y="4596272"/>
+              <a:ext cx="2273059" cy="872034"/>
+            </a:xfrm>
+            <a:prstGeom prst="rect">
+              <a:avLst/>
+            </a:prstGeom>
+            <a:noFill/>
+            <a:ln w="12700" cap="flat">
+              <a:noFill/>
+              <a:miter lim="400000"/>
+            </a:ln>
+            <a:effectLst/>
+            <a:sp3d/>
+          </p:spPr>
+          <p:style>
+            <a:lnRef idx="0">
+              <a:scrgbClr r="0" g="0" b="0"/>
+            </a:lnRef>
+            <a:fillRef idx="0">
+              <a:scrgbClr r="0" g="0" b="0"/>
+            </a:fillRef>
+            <a:effectRef idx="0">
+              <a:scrgbClr r="0" g="0" b="0"/>
+            </a:effectRef>
+            <a:fontRef idx="none"/>
+          </p:style>
+          <p:txBody>
+            <a:bodyPr rot="0" spcFirstLastPara="1" vertOverflow="overflow" horzOverflow="overflow" vert="horz" wrap="none" lIns="50800" tIns="50800" rIns="50800" bIns="50800" numCol="1" spcCol="38100" rtlCol="0" anchor="ctr">
+              <a:spAutoFit/>
+            </a:bodyPr>
+            <a:lstStyle/>
+            <a:p>
+              <a:pPr marL="0" marR="0" indent="0" algn="ctr" defTabSz="825500" rtl="0" fontAlgn="auto" latinLnBrk="0" hangingPunct="0">
+                <a:lnSpc>
+                  <a:spcPct val="100000"/>
+                </a:lnSpc>
+                <a:spcBef>
+                  <a:spcPts val="0"/>
+                </a:spcBef>
+                <a:spcAft>
+                  <a:spcPts val="0"/>
+                </a:spcAft>
+                <a:buClrTx/>
+                <a:buSzTx/>
+                <a:buFontTx/>
+                <a:buNone/>
+                <a:tabLst/>
+              </a:pPr>
+              <a:r>
+                <a:rPr kumimoji="0" lang="en-US" sz="5000" b="0" i="0" u="none" strike="noStrike" cap="none" spc="0" normalizeH="0" baseline="0" dirty="0">
+                  <a:ln>
+                    <a:noFill/>
+                  </a:ln>
+                  <a:solidFill>
+                    <a:srgbClr val="000000"/>
+                  </a:solidFill>
+                  <a:effectLst/>
+                  <a:uFillTx/>
+                  <a:latin typeface="+mn-lt"/>
+                  <a:ea typeface="+mn-ea"/>
+                  <a:cs typeface="+mn-cs"/>
+                  <a:sym typeface="Helvetica Light"/>
+                </a:rPr>
+                <a:t>Present</a:t>
+              </a:r>
+            </a:p>
+          </p:txBody>
+        </p:sp>
+      </p:grpSp>
+    </p:spTree>
+    <p:extLst>
+      <p:ext uri="{BB962C8B-B14F-4D97-AF65-F5344CB8AC3E}">
+        <p14:creationId xmlns:p14="http://schemas.microsoft.com/office/powerpoint/2010/main" val="1399862516"/>
+      </p:ext>
+    </p:extLst>
+  </p:cSld>
+  <p:clrMapOvr>
+    <a:masterClrMapping/>
+  </p:clrMapOvr>
+  <p:transition spd="med"/>
+</p:sld>
+</file>
+
+<file path=ppt/slides/slide4.xml><?xml version="1.0" encoding="utf-8"?>
+<p:sld xmlns:a="http://schemas.openxmlformats.org/drawingml/2006/main" xmlns:r="http://schemas.openxmlformats.org/officeDocument/2006/relationships" xmlns:p="http://schemas.openxmlformats.org/presentationml/2006/main">
+  <p:cSld>
+    <p:spTree>
+      <p:nvGrpSpPr>
+        <p:cNvPr id="1" name=""/>
+        <p:cNvGrpSpPr/>
+        <p:nvPr/>
+      </p:nvGrpSpPr>
+      <p:grpSpPr>
+        <a:xfrm>
+          <a:off x="0" y="0"/>
+          <a:ext cx="0" cy="0"/>
+          <a:chOff x="0" y="0"/>
+          <a:chExt cx="0" cy="0"/>
+        </a:xfrm>
+      </p:grpSpPr>
+      <p:grpSp>
+        <p:nvGrpSpPr>
           <p:cNvPr id="3" name="Group 2">
             <a:extLst>
               <a:ext uri="{FF2B5EF4-FFF2-40B4-BE49-F238E27FC236}">
@@ -5352,7 +6819,7 @@
             <a:effectLst/>
             <a:extLst>
               <a:ext uri="{C572A759-6A51-4108-AA02-DFA0A04FC94B}">
-                <ma14:wrappingTextBoxFlag xmlns="" xmlns:m="http://schemas.openxmlformats.org/officeDocument/2006/math" xmlns:a14="http://schemas.microsoft.com/office/drawing/2010/main" xmlns:ma14="http://schemas.microsoft.com/office/mac/drawingml/2011/main" val="1"/>
+                <ma14:wrappingTextBoxFlag xmlns:ma14="http://schemas.microsoft.com/office/mac/drawingml/2011/main" xmlns:a14="http://schemas.microsoft.com/office/drawing/2010/main" xmlns:m="http://schemas.openxmlformats.org/officeDocument/2006/math" xmlns="" val="1"/>
               </a:ext>
             </a:extLst>
           </p:spPr>
@@ -5452,7 +6919,7 @@
             <a:effectLst/>
             <a:extLst>
               <a:ext uri="{C572A759-6A51-4108-AA02-DFA0A04FC94B}">
-                <ma14:wrappingTextBoxFlag xmlns="" xmlns:m="http://schemas.openxmlformats.org/officeDocument/2006/math" xmlns:a14="http://schemas.microsoft.com/office/drawing/2010/main" xmlns:ma14="http://schemas.microsoft.com/office/mac/drawingml/2011/main" val="1"/>
+                <ma14:wrappingTextBoxFlag xmlns:ma14="http://schemas.microsoft.com/office/mac/drawingml/2011/main" xmlns:a14="http://schemas.microsoft.com/office/drawing/2010/main" xmlns:m="http://schemas.openxmlformats.org/officeDocument/2006/math" xmlns="" val="1"/>
               </a:ext>
             </a:extLst>
           </p:spPr>
@@ -5552,7 +7019,7 @@
             <a:effectLst/>
             <a:extLst>
               <a:ext uri="{C572A759-6A51-4108-AA02-DFA0A04FC94B}">
-                <ma14:wrappingTextBoxFlag xmlns="" xmlns:m="http://schemas.openxmlformats.org/officeDocument/2006/math" xmlns:a14="http://schemas.microsoft.com/office/drawing/2010/main" xmlns:ma14="http://schemas.microsoft.com/office/mac/drawingml/2011/main" val="1"/>
+                <ma14:wrappingTextBoxFlag xmlns:ma14="http://schemas.microsoft.com/office/mac/drawingml/2011/main" xmlns:a14="http://schemas.microsoft.com/office/drawing/2010/main" xmlns:m="http://schemas.openxmlformats.org/officeDocument/2006/math" xmlns="" val="1"/>
               </a:ext>
             </a:extLst>
           </p:spPr>
@@ -6074,7 +7541,7 @@
             </a:ln>
             <a:extLst>
               <a:ext uri="{C572A759-6A51-4108-AA02-DFA0A04FC94B}">
-                <ma14:wrappingTextBoxFlag xmlns="" xmlns:m="http://schemas.openxmlformats.org/officeDocument/2006/math" xmlns:a14="http://schemas.microsoft.com/office/drawing/2010/main" xmlns:ma14="http://schemas.microsoft.com/office/mac/drawingml/2011/main" val="1"/>
+                <ma14:wrappingTextBoxFlag xmlns:ma14="http://schemas.microsoft.com/office/mac/drawingml/2011/main" xmlns:a14="http://schemas.microsoft.com/office/drawing/2010/main" xmlns:m="http://schemas.openxmlformats.org/officeDocument/2006/math" xmlns="" val="1"/>
               </a:ext>
             </a:extLst>
           </p:spPr>
@@ -6293,7 +7760,7 @@
 </p:sld>
 </file>
 
-<file path=ppt/slides/slide4.xml><?xml version="1.0" encoding="utf-8"?>
+<file path=ppt/slides/slide5.xml><?xml version="1.0" encoding="utf-8"?>
 <p:sld xmlns:a="http://schemas.openxmlformats.org/drawingml/2006/main" xmlns:r="http://schemas.openxmlformats.org/officeDocument/2006/relationships" xmlns:p="http://schemas.openxmlformats.org/presentationml/2006/main">
   <p:cSld>
     <p:spTree>
@@ -6329,7 +7796,7 @@
           </a:ln>
           <a:extLst>
             <a:ext uri="{C572A759-6A51-4108-AA02-DFA0A04FC94B}">
-              <ma14:wrappingTextBoxFlag xmlns="" xmlns:m="http://schemas.openxmlformats.org/officeDocument/2006/math" xmlns:a14="http://schemas.microsoft.com/office/drawing/2010/main" xmlns:ma14="http://schemas.microsoft.com/office/mac/drawingml/2011/main" val="1"/>
+              <ma14:wrappingTextBoxFlag xmlns:ma14="http://schemas.microsoft.com/office/mac/drawingml/2011/main" xmlns:a14="http://schemas.microsoft.com/office/drawing/2010/main" xmlns:m="http://schemas.openxmlformats.org/officeDocument/2006/math" xmlns="" val="1"/>
             </a:ext>
           </a:extLst>
         </p:spPr>
@@ -6364,7 +7831,7 @@
           </a:ln>
           <a:extLst>
             <a:ext uri="{C572A759-6A51-4108-AA02-DFA0A04FC94B}">
-              <ma14:wrappingTextBoxFlag xmlns="" xmlns:m="http://schemas.openxmlformats.org/officeDocument/2006/math" xmlns:a14="http://schemas.microsoft.com/office/drawing/2010/main" xmlns:ma14="http://schemas.microsoft.com/office/mac/drawingml/2011/main" val="1"/>
+              <ma14:wrappingTextBoxFlag xmlns:ma14="http://schemas.microsoft.com/office/mac/drawingml/2011/main" xmlns:a14="http://schemas.microsoft.com/office/drawing/2010/main" xmlns:m="http://schemas.openxmlformats.org/officeDocument/2006/math" xmlns="" val="1"/>
             </a:ext>
           </a:extLst>
         </p:spPr>
@@ -6411,7 +7878,7 @@
           </a:ln>
           <a:extLst>
             <a:ext uri="{C572A759-6A51-4108-AA02-DFA0A04FC94B}">
-              <ma14:wrappingTextBoxFlag xmlns="" xmlns:m="http://schemas.openxmlformats.org/officeDocument/2006/math" xmlns:a14="http://schemas.microsoft.com/office/drawing/2010/main" xmlns:ma14="http://schemas.microsoft.com/office/mac/drawingml/2011/main" val="1"/>
+              <ma14:wrappingTextBoxFlag xmlns:ma14="http://schemas.microsoft.com/office/mac/drawingml/2011/main" xmlns:a14="http://schemas.microsoft.com/office/drawing/2010/main" xmlns:m="http://schemas.openxmlformats.org/officeDocument/2006/math" xmlns="" val="1"/>
             </a:ext>
           </a:extLst>
         </p:spPr>
@@ -6446,7 +7913,7 @@
           </a:ln>
           <a:extLst>
             <a:ext uri="{C572A759-6A51-4108-AA02-DFA0A04FC94B}">
-              <ma14:wrappingTextBoxFlag xmlns="" xmlns:m="http://schemas.openxmlformats.org/officeDocument/2006/math" xmlns:a14="http://schemas.microsoft.com/office/drawing/2010/main" xmlns:ma14="http://schemas.microsoft.com/office/mac/drawingml/2011/main" val="1"/>
+              <ma14:wrappingTextBoxFlag xmlns:ma14="http://schemas.microsoft.com/office/mac/drawingml/2011/main" xmlns:a14="http://schemas.microsoft.com/office/drawing/2010/main" xmlns:m="http://schemas.openxmlformats.org/officeDocument/2006/math" xmlns="" val="1"/>
             </a:ext>
           </a:extLst>
         </p:spPr>
@@ -6716,7 +8183,7 @@
         <p:dissolve/>
       </p:transition>
     </mc:Choice>
-    <mc:Fallback xmlns="" xmlns:m="http://schemas.openxmlformats.org/officeDocument/2006/math" xmlns:a14="http://schemas.microsoft.com/office/drawing/2010/main">
+    <mc:Fallback xmlns:a14="http://schemas.microsoft.com/office/drawing/2010/main" xmlns:m="http://schemas.openxmlformats.org/officeDocument/2006/math" xmlns="">
       <p:transition spd="slow">
         <p:fade/>
       </p:transition>
@@ -6913,7 +8380,7 @@
 </p:sld>
 </file>
 
-<file path=ppt/slides/slide5.xml><?xml version="1.0" encoding="utf-8"?>
+<file path=ppt/slides/slide6.xml><?xml version="1.0" encoding="utf-8"?>
 <p:sld xmlns:a="http://schemas.openxmlformats.org/drawingml/2006/main" xmlns:r="http://schemas.openxmlformats.org/officeDocument/2006/relationships" xmlns:p="http://schemas.openxmlformats.org/presentationml/2006/main">
   <p:cSld>
     <p:spTree>
@@ -6949,7 +8416,7 @@
           </a:ln>
           <a:extLst>
             <a:ext uri="{C572A759-6A51-4108-AA02-DFA0A04FC94B}">
-              <ma14:wrappingTextBoxFlag xmlns="" xmlns:m="http://schemas.openxmlformats.org/officeDocument/2006/math" xmlns:a14="http://schemas.microsoft.com/office/drawing/2010/main" xmlns:ma14="http://schemas.microsoft.com/office/mac/drawingml/2011/main" val="1"/>
+              <ma14:wrappingTextBoxFlag xmlns:ma14="http://schemas.microsoft.com/office/mac/drawingml/2011/main" xmlns:a14="http://schemas.microsoft.com/office/drawing/2010/main" xmlns:m="http://schemas.openxmlformats.org/officeDocument/2006/math" xmlns="" val="1"/>
             </a:ext>
           </a:extLst>
         </p:spPr>
@@ -7003,7 +8470,7 @@
           </a:ln>
           <a:extLst>
             <a:ext uri="{C572A759-6A51-4108-AA02-DFA0A04FC94B}">
-              <ma14:wrappingTextBoxFlag xmlns="" xmlns:m="http://schemas.openxmlformats.org/officeDocument/2006/math" xmlns:a14="http://schemas.microsoft.com/office/drawing/2010/main" xmlns:ma14="http://schemas.microsoft.com/office/mac/drawingml/2011/main" val="1"/>
+              <ma14:wrappingTextBoxFlag xmlns:ma14="http://schemas.microsoft.com/office/mac/drawingml/2011/main" xmlns:a14="http://schemas.microsoft.com/office/drawing/2010/main" xmlns:m="http://schemas.openxmlformats.org/officeDocument/2006/math" xmlns="" val="1"/>
             </a:ext>
           </a:extLst>
         </p:spPr>
@@ -7366,7 +8833,7 @@
         <p:dissolve/>
       </p:transition>
     </mc:Choice>
-    <mc:Fallback xmlns="" xmlns:m="http://schemas.openxmlformats.org/officeDocument/2006/math" xmlns:a14="http://schemas.microsoft.com/office/drawing/2010/main">
+    <mc:Fallback xmlns:a14="http://schemas.microsoft.com/office/drawing/2010/main" xmlns:m="http://schemas.openxmlformats.org/officeDocument/2006/math" xmlns="">
       <p:transition spd="slow">
         <p:fade/>
       </p:transition>
@@ -7375,7 +8842,490 @@
 </p:sld>
 </file>
 
-<file path=ppt/slides/slide6.xml><?xml version="1.0" encoding="utf-8"?>
+<file path=ppt/slides/slide7.xml><?xml version="1.0" encoding="utf-8"?>
+<p:sld xmlns:a="http://schemas.openxmlformats.org/drawingml/2006/main" xmlns:r="http://schemas.openxmlformats.org/officeDocument/2006/relationships" xmlns:p="http://schemas.openxmlformats.org/presentationml/2006/main">
+  <p:cSld>
+    <p:spTree>
+      <p:nvGrpSpPr>
+        <p:cNvPr id="1" name=""/>
+        <p:cNvGrpSpPr/>
+        <p:nvPr/>
+      </p:nvGrpSpPr>
+      <p:grpSpPr>
+        <a:xfrm>
+          <a:off x="0" y="0"/>
+          <a:ext cx="0" cy="0"/>
+          <a:chOff x="0" y="0"/>
+          <a:chExt cx="0" cy="0"/>
+        </a:xfrm>
+      </p:grpSpPr>
+      <p:grpSp>
+        <p:nvGrpSpPr>
+          <p:cNvPr id="2" name="Group 1">
+            <a:extLst>
+              <a:ext uri="{FF2B5EF4-FFF2-40B4-BE49-F238E27FC236}">
+                <a16:creationId xmlns:a16="http://schemas.microsoft.com/office/drawing/2014/main" id="{9BFCBF99-A30F-5E2E-875B-F248982B8A33}"/>
+              </a:ext>
+            </a:extLst>
+          </p:cNvPr>
+          <p:cNvGrpSpPr/>
+          <p:nvPr/>
+        </p:nvGrpSpPr>
+        <p:grpSpPr>
+          <a:xfrm>
+            <a:off x="12747273" y="2526442"/>
+            <a:ext cx="8663115" cy="8663115"/>
+            <a:chOff x="12233534" y="3886200"/>
+            <a:chExt cx="5943600" cy="5943600"/>
+          </a:xfrm>
+        </p:grpSpPr>
+        <p:sp>
+          <p:nvSpPr>
+            <p:cNvPr id="3" name="Oval 2">
+              <a:extLst>
+                <a:ext uri="{FF2B5EF4-FFF2-40B4-BE49-F238E27FC236}">
+                  <a16:creationId xmlns:a16="http://schemas.microsoft.com/office/drawing/2014/main" id="{77757577-C4A2-1623-A8FE-539530B05004}"/>
+                </a:ext>
+              </a:extLst>
+            </p:cNvPr>
+            <p:cNvSpPr/>
+            <p:nvPr/>
+          </p:nvSpPr>
+          <p:spPr>
+            <a:xfrm>
+              <a:off x="12233534" y="3886200"/>
+              <a:ext cx="5943600" cy="5943600"/>
+            </a:xfrm>
+            <a:prstGeom prst="ellipse">
+              <a:avLst/>
+            </a:prstGeom>
+            <a:noFill/>
+            <a:ln w="28575" cap="flat">
+              <a:solidFill>
+                <a:schemeClr val="accent2">
+                  <a:lumMod val="60000"/>
+                  <a:lumOff val="40000"/>
+                </a:schemeClr>
+              </a:solidFill>
+              <a:miter lim="400000"/>
+            </a:ln>
+            <a:effectLst>
+              <a:outerShdw blurRad="38100" dist="25400" dir="5400000" rotWithShape="0">
+                <a:srgbClr val="000000">
+                  <a:alpha val="50000"/>
+                </a:srgbClr>
+              </a:outerShdw>
+            </a:effectLst>
+            <a:sp3d/>
+          </p:spPr>
+          <p:style>
+            <a:lnRef idx="0">
+              <a:scrgbClr r="0" g="0" b="0"/>
+            </a:lnRef>
+            <a:fillRef idx="0">
+              <a:scrgbClr r="0" g="0" b="0"/>
+            </a:fillRef>
+            <a:effectRef idx="0">
+              <a:scrgbClr r="0" g="0" b="0"/>
+            </a:effectRef>
+            <a:fontRef idx="none"/>
+          </p:style>
+          <p:txBody>
+            <a:bodyPr rot="0" spcFirstLastPara="1" vertOverflow="overflow" horzOverflow="overflow" vert="horz" wrap="square" lIns="50800" tIns="50800" rIns="50800" bIns="50800" numCol="1" spcCol="38100" rtlCol="0" anchor="ctr">
+              <a:spAutoFit/>
+            </a:bodyPr>
+            <a:lstStyle/>
+            <a:p>
+              <a:pPr marL="0" marR="0" indent="0" algn="ctr" defTabSz="825500" rtl="0" fontAlgn="auto" latinLnBrk="0" hangingPunct="0">
+                <a:lnSpc>
+                  <a:spcPct val="100000"/>
+                </a:lnSpc>
+                <a:spcBef>
+                  <a:spcPts val="0"/>
+                </a:spcBef>
+                <a:spcAft>
+                  <a:spcPts val="0"/>
+                </a:spcAft>
+                <a:buClrTx/>
+                <a:buSzTx/>
+                <a:buFontTx/>
+                <a:buNone/>
+                <a:tabLst/>
+              </a:pPr>
+              <a:endParaRPr kumimoji="0" lang="en-US" sz="3200" b="0" i="0" u="none" strike="noStrike" cap="none" spc="0" normalizeH="0" baseline="0">
+                <a:ln>
+                  <a:noFill/>
+                </a:ln>
+                <a:solidFill>
+                  <a:srgbClr val="FFFFFF"/>
+                </a:solidFill>
+                <a:effectLst/>
+                <a:uFillTx/>
+                <a:latin typeface="+mn-lt"/>
+                <a:ea typeface="+mn-ea"/>
+                <a:cs typeface="+mn-cs"/>
+                <a:sym typeface="Helvetica Light"/>
+              </a:endParaRPr>
+            </a:p>
+          </p:txBody>
+        </p:sp>
+        <p:pic>
+          <p:nvPicPr>
+            <p:cNvPr id="4" name="Picture 3" descr="A picture containing drawing&#10;&#10;Description automatically generated">
+              <a:extLst>
+                <a:ext uri="{FF2B5EF4-FFF2-40B4-BE49-F238E27FC236}">
+                  <a16:creationId xmlns:a16="http://schemas.microsoft.com/office/drawing/2014/main" id="{98267748-1C18-1060-8487-7BD86CDBC177}"/>
+                </a:ext>
+              </a:extLst>
+            </p:cNvPr>
+            <p:cNvPicPr>
+              <a:picLocks noChangeAspect="1"/>
+            </p:cNvPicPr>
+            <p:nvPr/>
+          </p:nvPicPr>
+          <p:blipFill>
+            <a:blip r:embed="rId3">
+              <a:extLst>
+                <a:ext uri="{28A0092B-C50C-407E-A947-70E740481C1C}">
+                  <a14:useLocalDpi xmlns:a14="http://schemas.microsoft.com/office/drawing/2010/main" val="0"/>
+                </a:ext>
+              </a:extLst>
+            </a:blip>
+            <a:stretch>
+              <a:fillRect/>
+            </a:stretch>
+          </p:blipFill>
+          <p:spPr>
+            <a:xfrm>
+              <a:off x="13319902" y="5622662"/>
+              <a:ext cx="3618812" cy="3618812"/>
+            </a:xfrm>
+            <a:prstGeom prst="rect">
+              <a:avLst/>
+            </a:prstGeom>
+          </p:spPr>
+        </p:pic>
+        <p:sp>
+          <p:nvSpPr>
+            <p:cNvPr id="5" name="TextBox 4">
+              <a:extLst>
+                <a:ext uri="{FF2B5EF4-FFF2-40B4-BE49-F238E27FC236}">
+                  <a16:creationId xmlns:a16="http://schemas.microsoft.com/office/drawing/2014/main" id="{088C68FD-FFD7-29B4-CD00-541BD5638296}"/>
+                </a:ext>
+              </a:extLst>
+            </p:cNvPr>
+            <p:cNvSpPr txBox="1"/>
+            <p:nvPr/>
+          </p:nvSpPr>
+          <p:spPr>
+            <a:xfrm>
+              <a:off x="14014302" y="4600628"/>
+              <a:ext cx="2382063" cy="872034"/>
+            </a:xfrm>
+            <a:prstGeom prst="rect">
+              <a:avLst/>
+            </a:prstGeom>
+            <a:noFill/>
+            <a:ln w="12700" cap="flat">
+              <a:noFill/>
+              <a:miter lim="400000"/>
+            </a:ln>
+            <a:effectLst/>
+            <a:sp3d/>
+          </p:spPr>
+          <p:style>
+            <a:lnRef idx="0">
+              <a:scrgbClr r="0" g="0" b="0"/>
+            </a:lnRef>
+            <a:fillRef idx="0">
+              <a:scrgbClr r="0" g="0" b="0"/>
+            </a:fillRef>
+            <a:effectRef idx="0">
+              <a:scrgbClr r="0" g="0" b="0"/>
+            </a:effectRef>
+            <a:fontRef idx="none"/>
+          </p:style>
+          <p:txBody>
+            <a:bodyPr rot="0" spcFirstLastPara="1" vertOverflow="overflow" horzOverflow="overflow" vert="horz" wrap="none" lIns="50800" tIns="50800" rIns="50800" bIns="50800" numCol="1" spcCol="38100" rtlCol="0" anchor="ctr">
+              <a:spAutoFit/>
+            </a:bodyPr>
+            <a:lstStyle/>
+            <a:p>
+              <a:pPr marL="0" marR="0" indent="0" algn="ctr" defTabSz="825500" rtl="0" fontAlgn="auto" latinLnBrk="0" hangingPunct="0">
+                <a:lnSpc>
+                  <a:spcPct val="100000"/>
+                </a:lnSpc>
+                <a:spcBef>
+                  <a:spcPts val="0"/>
+                </a:spcBef>
+                <a:spcAft>
+                  <a:spcPts val="0"/>
+                </a:spcAft>
+                <a:buClrTx/>
+                <a:buSzTx/>
+                <a:buFontTx/>
+                <a:buNone/>
+                <a:tabLst/>
+              </a:pPr>
+              <a:r>
+                <a:rPr kumimoji="0" lang="en-US" sz="5000" b="0" i="0" u="none" strike="noStrike" cap="none" spc="0" normalizeH="0" baseline="0" dirty="0">
+                  <a:ln>
+                    <a:noFill/>
+                  </a:ln>
+                  <a:solidFill>
+                    <a:srgbClr val="000000"/>
+                  </a:solidFill>
+                  <a:effectLst/>
+                  <a:uFillTx/>
+                  <a:latin typeface="+mn-lt"/>
+                  <a:ea typeface="+mn-ea"/>
+                  <a:cs typeface="+mn-cs"/>
+                  <a:sym typeface="Helvetica Light"/>
+                </a:rPr>
+                <a:t>Analyze</a:t>
+              </a:r>
+            </a:p>
+          </p:txBody>
+        </p:sp>
+      </p:grpSp>
+      <p:grpSp>
+        <p:nvGrpSpPr>
+          <p:cNvPr id="11" name="Group 10">
+            <a:extLst>
+              <a:ext uri="{FF2B5EF4-FFF2-40B4-BE49-F238E27FC236}">
+                <a16:creationId xmlns:a16="http://schemas.microsoft.com/office/drawing/2014/main" id="{D59E3BA9-FC45-1ED8-E56F-A646EF0147CB}"/>
+              </a:ext>
+            </a:extLst>
+          </p:cNvPr>
+          <p:cNvGrpSpPr/>
+          <p:nvPr/>
+        </p:nvGrpSpPr>
+        <p:grpSpPr>
+          <a:xfrm>
+            <a:off x="1661291" y="1522088"/>
+            <a:ext cx="8111196" cy="11199607"/>
+            <a:chOff x="11999693" y="1285022"/>
+            <a:chExt cx="8111196" cy="11199607"/>
+          </a:xfrm>
+        </p:grpSpPr>
+        <p:sp>
+          <p:nvSpPr>
+            <p:cNvPr id="202" name="Validating and Cleaning"/>
+            <p:cNvSpPr txBox="1"/>
+            <p:nvPr/>
+          </p:nvSpPr>
+          <p:spPr>
+            <a:xfrm>
+              <a:off x="13013592" y="1285022"/>
+              <a:ext cx="6083397" cy="872034"/>
+            </a:xfrm>
+            <a:prstGeom prst="rect">
+              <a:avLst/>
+            </a:prstGeom>
+            <a:ln w="12700">
+              <a:miter lim="400000"/>
+            </a:ln>
+            <a:extLst>
+              <a:ext uri="{C572A759-6A51-4108-AA02-DFA0A04FC94B}">
+                <ma14:wrappingTextBoxFlag xmlns="" xmlns:m="http://schemas.openxmlformats.org/officeDocument/2006/math" xmlns:a14="http://schemas.microsoft.com/office/drawing/2010/main" xmlns:ma14="http://schemas.microsoft.com/office/mac/drawingml/2011/main" val="1"/>
+              </a:ext>
+            </a:extLst>
+          </p:spPr>
+          <p:txBody>
+            <a:bodyPr wrap="none" lIns="50800" tIns="50800" rIns="50800" bIns="50800" anchor="ctr">
+              <a:spAutoFit/>
+            </a:bodyPr>
+            <a:lstStyle/>
+            <a:p>
+              <a:r>
+                <a:rPr lang="en-US" dirty="0"/>
+                <a:t>Descriptive Statistics</a:t>
+              </a:r>
+              <a:endParaRPr dirty="0"/>
+            </a:p>
+          </p:txBody>
+        </p:sp>
+        <p:sp>
+          <p:nvSpPr>
+            <p:cNvPr id="203" name="Subsetting"/>
+            <p:cNvSpPr txBox="1"/>
+            <p:nvPr/>
+          </p:nvSpPr>
+          <p:spPr>
+            <a:xfrm>
+              <a:off x="12960694" y="3866915"/>
+              <a:ext cx="6189195" cy="872034"/>
+            </a:xfrm>
+            <a:prstGeom prst="rect">
+              <a:avLst/>
+            </a:prstGeom>
+            <a:ln w="12700">
+              <a:miter lim="400000"/>
+            </a:ln>
+            <a:extLst>
+              <a:ext uri="{C572A759-6A51-4108-AA02-DFA0A04FC94B}">
+                <ma14:wrappingTextBoxFlag xmlns="" xmlns:m="http://schemas.openxmlformats.org/officeDocument/2006/math" xmlns:a14="http://schemas.microsoft.com/office/drawing/2010/main" xmlns:ma14="http://schemas.microsoft.com/office/mac/drawingml/2011/main" val="1"/>
+              </a:ext>
+            </a:extLst>
+          </p:spPr>
+          <p:txBody>
+            <a:bodyPr wrap="none" lIns="50800" tIns="50800" rIns="50800" bIns="50800" anchor="ctr">
+              <a:spAutoFit/>
+            </a:bodyPr>
+            <a:lstStyle/>
+            <a:p>
+              <a:r>
+                <a:rPr lang="en-US" dirty="0"/>
+                <a:t>Regression Modeling</a:t>
+              </a:r>
+              <a:endParaRPr dirty="0"/>
+            </a:p>
+          </p:txBody>
+        </p:sp>
+        <p:sp>
+          <p:nvSpPr>
+            <p:cNvPr id="204" name="New Variables"/>
+            <p:cNvSpPr txBox="1"/>
+            <p:nvPr/>
+          </p:nvSpPr>
+          <p:spPr>
+            <a:xfrm>
+              <a:off x="13312014" y="6448808"/>
+              <a:ext cx="5297924" cy="872034"/>
+            </a:xfrm>
+            <a:prstGeom prst="rect">
+              <a:avLst/>
+            </a:prstGeom>
+            <a:ln w="12700">
+              <a:miter lim="400000"/>
+            </a:ln>
+            <a:extLst>
+              <a:ext uri="{C572A759-6A51-4108-AA02-DFA0A04FC94B}">
+                <ma14:wrappingTextBoxFlag xmlns="" xmlns:m="http://schemas.openxmlformats.org/officeDocument/2006/math" xmlns:a14="http://schemas.microsoft.com/office/drawing/2010/main" xmlns:ma14="http://schemas.microsoft.com/office/mac/drawingml/2011/main" val="1"/>
+              </a:ext>
+            </a:extLst>
+          </p:spPr>
+          <p:txBody>
+            <a:bodyPr wrap="none" lIns="50800" tIns="50800" rIns="50800" bIns="50800" anchor="ctr">
+              <a:spAutoFit/>
+            </a:bodyPr>
+            <a:lstStyle/>
+            <a:p>
+              <a:r>
+                <a:rPr lang="en-US" dirty="0"/>
+                <a:t>Machine Learning</a:t>
+              </a:r>
+              <a:endParaRPr dirty="0"/>
+            </a:p>
+          </p:txBody>
+        </p:sp>
+        <p:sp>
+          <p:nvSpPr>
+            <p:cNvPr id="205" name="Combining"/>
+            <p:cNvSpPr txBox="1"/>
+            <p:nvPr/>
+          </p:nvSpPr>
+          <p:spPr>
+            <a:xfrm>
+              <a:off x="11999693" y="11612595"/>
+              <a:ext cx="8111196" cy="872034"/>
+            </a:xfrm>
+            <a:prstGeom prst="rect">
+              <a:avLst/>
+            </a:prstGeom>
+            <a:ln w="12700">
+              <a:miter lim="400000"/>
+            </a:ln>
+            <a:extLst>
+              <a:ext uri="{C572A759-6A51-4108-AA02-DFA0A04FC94B}">
+                <ma14:wrappingTextBoxFlag xmlns="" xmlns:m="http://schemas.openxmlformats.org/officeDocument/2006/math" xmlns:a14="http://schemas.microsoft.com/office/drawing/2010/main" xmlns:ma14="http://schemas.microsoft.com/office/mac/drawingml/2011/main" val="1"/>
+              </a:ext>
+            </a:extLst>
+          </p:spPr>
+          <p:txBody>
+            <a:bodyPr wrap="none" lIns="50800" tIns="50800" rIns="50800" bIns="50800" anchor="ctr">
+              <a:spAutoFit/>
+            </a:bodyPr>
+            <a:lstStyle/>
+            <a:p>
+              <a:r>
+                <a:rPr lang="en-US" dirty="0"/>
+                <a:t>Causal Inference Estimation</a:t>
+              </a:r>
+              <a:endParaRPr dirty="0"/>
+            </a:p>
+          </p:txBody>
+        </p:sp>
+        <p:sp>
+          <p:nvSpPr>
+            <p:cNvPr id="6" name="New Variables">
+              <a:extLst>
+                <a:ext uri="{FF2B5EF4-FFF2-40B4-BE49-F238E27FC236}">
+                  <a16:creationId xmlns:a16="http://schemas.microsoft.com/office/drawing/2014/main" id="{285CC226-4A64-4826-97C9-0BB0FBF530AA}"/>
+                </a:ext>
+              </a:extLst>
+            </p:cNvPr>
+            <p:cNvSpPr txBox="1"/>
+            <p:nvPr/>
+          </p:nvSpPr>
+          <p:spPr>
+            <a:xfrm>
+              <a:off x="13008251" y="9030701"/>
+              <a:ext cx="5905463" cy="872034"/>
+            </a:xfrm>
+            <a:prstGeom prst="rect">
+              <a:avLst/>
+            </a:prstGeom>
+            <a:ln w="12700">
+              <a:miter lim="400000"/>
+            </a:ln>
+            <a:extLst>
+              <a:ext uri="{C572A759-6A51-4108-AA02-DFA0A04FC94B}">
+                <ma14:wrappingTextBoxFlag xmlns="" xmlns:m="http://schemas.openxmlformats.org/officeDocument/2006/math" xmlns:a14="http://schemas.microsoft.com/office/drawing/2010/main" xmlns:ma14="http://schemas.microsoft.com/office/mac/drawingml/2011/main" val="1"/>
+              </a:ext>
+            </a:extLst>
+          </p:spPr>
+          <p:txBody>
+            <a:bodyPr wrap="none" lIns="50800" tIns="50800" rIns="50800" bIns="50800" anchor="ctr">
+              <a:spAutoFit/>
+            </a:bodyPr>
+            <a:lstStyle/>
+            <a:p>
+              <a:r>
+                <a:rPr lang="en-US" dirty="0"/>
+                <a:t>Predictive Analytics</a:t>
+              </a:r>
+              <a:endParaRPr dirty="0"/>
+            </a:p>
+          </p:txBody>
+        </p:sp>
+      </p:grpSp>
+    </p:spTree>
+    <p:extLst>
+      <p:ext uri="{BB962C8B-B14F-4D97-AF65-F5344CB8AC3E}">
+        <p14:creationId xmlns:p14="http://schemas.microsoft.com/office/powerpoint/2010/main" val="3378901527"/>
+      </p:ext>
+    </p:extLst>
+  </p:cSld>
+  <p:clrMapOvr>
+    <a:masterClrMapping/>
+  </p:clrMapOvr>
+  <mc:AlternateContent xmlns:mc="http://schemas.openxmlformats.org/markup-compatibility/2006">
+    <mc:Choice xmlns:p14="http://schemas.microsoft.com/office/powerpoint/2010/main" Requires="p14">
+      <p:transition spd="slow" p14:dur="2000">
+        <p:dissolve/>
+      </p:transition>
+    </mc:Choice>
+    <mc:Fallback>
+      <p:transition spd="slow">
+        <p:dissolve/>
+      </p:transition>
+    </mc:Fallback>
+  </mc:AlternateContent>
+</p:sld>
+</file>
+
+<file path=ppt/slides/slide8.xml><?xml version="1.0" encoding="utf-8"?>
 <p:sld xmlns:a="http://schemas.openxmlformats.org/drawingml/2006/main" xmlns:r="http://schemas.openxmlformats.org/officeDocument/2006/relationships" xmlns:p="http://schemas.openxmlformats.org/presentationml/2006/main">
   <p:cSld>
     <p:spTree>
@@ -7428,7 +9378,7 @@
             <a:effectLst/>
             <a:extLst>
               <a:ext uri="{C572A759-6A51-4108-AA02-DFA0A04FC94B}">
-                <ma14:wrappingTextBoxFlag xmlns="" xmlns:m="http://schemas.openxmlformats.org/officeDocument/2006/math" xmlns:a14="http://schemas.microsoft.com/office/drawing/2010/main" xmlns:ma14="http://schemas.microsoft.com/office/mac/drawingml/2011/main" val="1"/>
+                <ma14:wrappingTextBoxFlag xmlns:ma14="http://schemas.microsoft.com/office/mac/drawingml/2011/main" xmlns:a14="http://schemas.microsoft.com/office/drawing/2010/main" xmlns:m="http://schemas.openxmlformats.org/officeDocument/2006/math" xmlns="" val="1"/>
               </a:ext>
             </a:extLst>
           </p:spPr>
@@ -8326,7 +10276,7 @@
             <a:effectLst/>
             <a:extLst>
               <a:ext uri="{C572A759-6A51-4108-AA02-DFA0A04FC94B}">
-                <ma14:wrappingTextBoxFlag xmlns="" xmlns:m="http://schemas.openxmlformats.org/officeDocument/2006/math" xmlns:a14="http://schemas.microsoft.com/office/drawing/2010/main" xmlns:ma14="http://schemas.microsoft.com/office/mac/drawingml/2011/main" val="1"/>
+                <ma14:wrappingTextBoxFlag xmlns:ma14="http://schemas.microsoft.com/office/mac/drawingml/2011/main" xmlns:a14="http://schemas.microsoft.com/office/drawing/2010/main" xmlns:m="http://schemas.openxmlformats.org/officeDocument/2006/math" xmlns="" val="1"/>
               </a:ext>
             </a:extLst>
           </p:spPr>
@@ -8948,12 +10898,305 @@
         <p:dissolve/>
       </p:transition>
     </mc:Choice>
-    <mc:Fallback xmlns="" xmlns:m="http://schemas.openxmlformats.org/officeDocument/2006/math" xmlns:a14="http://schemas.microsoft.com/office/drawing/2010/main">
+    <mc:Fallback xmlns:a14="http://schemas.microsoft.com/office/drawing/2010/main" xmlns:m="http://schemas.openxmlformats.org/officeDocument/2006/math" xmlns="">
       <p:transition spd="slow">
         <p:fade/>
       </p:transition>
     </mc:Fallback>
   </mc:AlternateContent>
+</p:sld>
+</file>
+
+<file path=ppt/slides/slide9.xml><?xml version="1.0" encoding="utf-8"?>
+<p:sld xmlns:a="http://schemas.openxmlformats.org/drawingml/2006/main" xmlns:r="http://schemas.openxmlformats.org/officeDocument/2006/relationships" xmlns:p="http://schemas.openxmlformats.org/presentationml/2006/main">
+  <p:cSld>
+    <p:spTree>
+      <p:nvGrpSpPr>
+        <p:cNvPr id="1" name=""/>
+        <p:cNvGrpSpPr/>
+        <p:nvPr/>
+      </p:nvGrpSpPr>
+      <p:grpSpPr>
+        <a:xfrm>
+          <a:off x="0" y="0"/>
+          <a:ext cx="0" cy="0"/>
+          <a:chOff x="0" y="0"/>
+          <a:chExt cx="0" cy="0"/>
+        </a:xfrm>
+      </p:grpSpPr>
+      <p:grpSp>
+        <p:nvGrpSpPr>
+          <p:cNvPr id="2" name="Group 1">
+            <a:extLst>
+              <a:ext uri="{FF2B5EF4-FFF2-40B4-BE49-F238E27FC236}">
+                <a16:creationId xmlns:a16="http://schemas.microsoft.com/office/drawing/2014/main" id="{96838D59-C613-12BB-998D-E553C561DC9A}"/>
+              </a:ext>
+            </a:extLst>
+          </p:cNvPr>
+          <p:cNvGrpSpPr/>
+          <p:nvPr/>
+        </p:nvGrpSpPr>
+        <p:grpSpPr>
+          <a:xfrm>
+            <a:off x="2383366" y="3008604"/>
+            <a:ext cx="7698791" cy="7698791"/>
+            <a:chOff x="13830300" y="7797786"/>
+            <a:chExt cx="5943600" cy="5943600"/>
+          </a:xfrm>
+        </p:grpSpPr>
+        <p:pic>
+          <p:nvPicPr>
+            <p:cNvPr id="3" name="Picture 2" descr="A black and white image of a set of knobs&#10;&#10;Description automatically generated">
+              <a:extLst>
+                <a:ext uri="{FF2B5EF4-FFF2-40B4-BE49-F238E27FC236}">
+                  <a16:creationId xmlns:a16="http://schemas.microsoft.com/office/drawing/2014/main" id="{13C8ADEB-41FE-4689-FC12-546E0F047CFE}"/>
+                </a:ext>
+              </a:extLst>
+            </p:cNvPr>
+            <p:cNvPicPr>
+              <a:picLocks noChangeAspect="1"/>
+            </p:cNvPicPr>
+            <p:nvPr/>
+          </p:nvPicPr>
+          <p:blipFill>
+            <a:blip r:embed="rId3">
+              <a:extLst>
+                <a:ext uri="{28A0092B-C50C-407E-A947-70E740481C1C}">
+                  <a14:useLocalDpi xmlns:a14="http://schemas.microsoft.com/office/drawing/2010/main" val="0"/>
+                </a:ext>
+              </a:extLst>
+            </a:blip>
+            <a:stretch>
+              <a:fillRect/>
+            </a:stretch>
+          </p:blipFill>
+          <p:spPr>
+            <a:xfrm>
+              <a:off x="15289947" y="10089962"/>
+              <a:ext cx="3018641" cy="3018641"/>
+            </a:xfrm>
+            <a:prstGeom prst="rect">
+              <a:avLst/>
+            </a:prstGeom>
+          </p:spPr>
+        </p:pic>
+        <p:sp>
+          <p:nvSpPr>
+            <p:cNvPr id="4" name="Oval 3">
+              <a:extLst>
+                <a:ext uri="{FF2B5EF4-FFF2-40B4-BE49-F238E27FC236}">
+                  <a16:creationId xmlns:a16="http://schemas.microsoft.com/office/drawing/2014/main" id="{87CBABC3-0FD7-F7E9-331F-74D227D6D422}"/>
+                </a:ext>
+              </a:extLst>
+            </p:cNvPr>
+            <p:cNvSpPr/>
+            <p:nvPr/>
+          </p:nvSpPr>
+          <p:spPr>
+            <a:xfrm>
+              <a:off x="13830300" y="7797786"/>
+              <a:ext cx="5943600" cy="5943600"/>
+            </a:xfrm>
+            <a:prstGeom prst="ellipse">
+              <a:avLst/>
+            </a:prstGeom>
+            <a:noFill/>
+            <a:ln w="28575" cap="flat">
+              <a:solidFill>
+                <a:schemeClr val="accent3"/>
+              </a:solidFill>
+              <a:miter lim="400000"/>
+            </a:ln>
+            <a:effectLst>
+              <a:outerShdw blurRad="38100" dist="25400" dir="5400000" rotWithShape="0">
+                <a:srgbClr val="000000">
+                  <a:alpha val="50000"/>
+                </a:srgbClr>
+              </a:outerShdw>
+            </a:effectLst>
+            <a:sp3d/>
+          </p:spPr>
+          <p:style>
+            <a:lnRef idx="0">
+              <a:scrgbClr r="0" g="0" b="0"/>
+            </a:lnRef>
+            <a:fillRef idx="0">
+              <a:scrgbClr r="0" g="0" b="0"/>
+            </a:fillRef>
+            <a:effectRef idx="0">
+              <a:scrgbClr r="0" g="0" b="0"/>
+            </a:effectRef>
+            <a:fontRef idx="none"/>
+          </p:style>
+          <p:txBody>
+            <a:bodyPr rot="0" spcFirstLastPara="1" vertOverflow="overflow" horzOverflow="overflow" vert="horz" wrap="square" lIns="50800" tIns="50800" rIns="50800" bIns="50800" numCol="1" spcCol="38100" rtlCol="0" anchor="ctr">
+              <a:spAutoFit/>
+            </a:bodyPr>
+            <a:lstStyle/>
+            <a:p>
+              <a:pPr marL="0" marR="0" indent="0" algn="ctr" defTabSz="825500" rtl="0" fontAlgn="auto" latinLnBrk="0" hangingPunct="0">
+                <a:lnSpc>
+                  <a:spcPct val="100000"/>
+                </a:lnSpc>
+                <a:spcBef>
+                  <a:spcPts val="0"/>
+                </a:spcBef>
+                <a:spcAft>
+                  <a:spcPts val="0"/>
+                </a:spcAft>
+                <a:buClrTx/>
+                <a:buSzTx/>
+                <a:buFontTx/>
+                <a:buNone/>
+                <a:tabLst/>
+              </a:pPr>
+              <a:endParaRPr kumimoji="0" lang="en-US" sz="3200" b="0" i="0" u="none" strike="noStrike" cap="none" spc="0" normalizeH="0" baseline="0">
+                <a:ln>
+                  <a:noFill/>
+                </a:ln>
+                <a:solidFill>
+                  <a:srgbClr val="FFFFFF"/>
+                </a:solidFill>
+                <a:effectLst/>
+                <a:uFillTx/>
+                <a:latin typeface="+mn-lt"/>
+                <a:ea typeface="+mn-ea"/>
+                <a:cs typeface="+mn-cs"/>
+                <a:sym typeface="Helvetica Light"/>
+              </a:endParaRPr>
+            </a:p>
+          </p:txBody>
+        </p:sp>
+        <p:sp>
+          <p:nvSpPr>
+            <p:cNvPr id="5" name="TextBox 4">
+              <a:extLst>
+                <a:ext uri="{FF2B5EF4-FFF2-40B4-BE49-F238E27FC236}">
+                  <a16:creationId xmlns:a16="http://schemas.microsoft.com/office/drawing/2014/main" id="{7608981A-4CBC-8077-1AA6-27931CA4404D}"/>
+                </a:ext>
+              </a:extLst>
+            </p:cNvPr>
+            <p:cNvSpPr txBox="1"/>
+            <p:nvPr/>
+          </p:nvSpPr>
+          <p:spPr>
+            <a:xfrm>
+              <a:off x="15662739" y="8507858"/>
+              <a:ext cx="2273059" cy="872034"/>
+            </a:xfrm>
+            <a:prstGeom prst="rect">
+              <a:avLst/>
+            </a:prstGeom>
+            <a:noFill/>
+            <a:ln w="12700" cap="flat">
+              <a:noFill/>
+              <a:miter lim="400000"/>
+            </a:ln>
+            <a:effectLst/>
+            <a:sp3d/>
+          </p:spPr>
+          <p:style>
+            <a:lnRef idx="0">
+              <a:scrgbClr r="0" g="0" b="0"/>
+            </a:lnRef>
+            <a:fillRef idx="0">
+              <a:scrgbClr r="0" g="0" b="0"/>
+            </a:fillRef>
+            <a:effectRef idx="0">
+              <a:scrgbClr r="0" g="0" b="0"/>
+            </a:effectRef>
+            <a:fontRef idx="none"/>
+          </p:style>
+          <p:txBody>
+            <a:bodyPr rot="0" spcFirstLastPara="1" vertOverflow="overflow" horzOverflow="overflow" vert="horz" wrap="none" lIns="50800" tIns="50800" rIns="50800" bIns="50800" numCol="1" spcCol="38100" rtlCol="0" anchor="ctr">
+              <a:spAutoFit/>
+            </a:bodyPr>
+            <a:lstStyle/>
+            <a:p>
+              <a:pPr marL="0" marR="0" indent="0" algn="ctr" defTabSz="825500" rtl="0" fontAlgn="auto" latinLnBrk="0" hangingPunct="0">
+                <a:lnSpc>
+                  <a:spcPct val="100000"/>
+                </a:lnSpc>
+                <a:spcBef>
+                  <a:spcPts val="0"/>
+                </a:spcBef>
+                <a:spcAft>
+                  <a:spcPts val="0"/>
+                </a:spcAft>
+                <a:buClrTx/>
+                <a:buSzTx/>
+                <a:buFontTx/>
+                <a:buNone/>
+                <a:tabLst/>
+              </a:pPr>
+              <a:r>
+                <a:rPr kumimoji="0" lang="en-US" sz="5000" b="0" i="0" u="none" strike="noStrike" cap="none" spc="0" normalizeH="0" baseline="0" dirty="0">
+                  <a:ln>
+                    <a:noFill/>
+                  </a:ln>
+                  <a:solidFill>
+                    <a:srgbClr val="000000"/>
+                  </a:solidFill>
+                  <a:effectLst/>
+                  <a:uFillTx/>
+                  <a:latin typeface="+mn-lt"/>
+                  <a:ea typeface="+mn-ea"/>
+                  <a:cs typeface="+mn-cs"/>
+                  <a:sym typeface="Helvetica Light"/>
+                </a:rPr>
+                <a:t>Interact</a:t>
+              </a:r>
+            </a:p>
+          </p:txBody>
+        </p:sp>
+      </p:grpSp>
+      <p:pic>
+        <p:nvPicPr>
+          <p:cNvPr id="7" name="Picture 6" descr="A blue hexagon with white text&#10;&#10;Description automatically generated">
+            <a:extLst>
+              <a:ext uri="{FF2B5EF4-FFF2-40B4-BE49-F238E27FC236}">
+                <a16:creationId xmlns:a16="http://schemas.microsoft.com/office/drawing/2014/main" id="{BDC347D6-B580-FEBA-694E-39B5FF06E6E6}"/>
+              </a:ext>
+            </a:extLst>
+          </p:cNvPr>
+          <p:cNvPicPr>
+            <a:picLocks noChangeAspect="1"/>
+          </p:cNvPicPr>
+          <p:nvPr/>
+        </p:nvPicPr>
+        <p:blipFill>
+          <a:blip r:embed="rId4">
+            <a:extLst>
+              <a:ext uri="{28A0092B-C50C-407E-A947-70E740481C1C}">
+                <a14:useLocalDpi xmlns:a14="http://schemas.microsoft.com/office/drawing/2010/main" val="0"/>
+              </a:ext>
+            </a:extLst>
+          </a:blip>
+          <a:stretch>
+            <a:fillRect/>
+          </a:stretch>
+        </p:blipFill>
+        <p:spPr>
+          <a:xfrm>
+            <a:off x="14301845" y="2392700"/>
+            <a:ext cx="7698791" cy="8930598"/>
+          </a:xfrm>
+          <a:prstGeom prst="rect">
+            <a:avLst/>
+          </a:prstGeom>
+        </p:spPr>
+      </p:pic>
+    </p:spTree>
+    <p:extLst>
+      <p:ext uri="{BB962C8B-B14F-4D97-AF65-F5344CB8AC3E}">
+        <p14:creationId xmlns:p14="http://schemas.microsoft.com/office/powerpoint/2010/main" val="2164100464"/>
+      </p:ext>
+    </p:extLst>
+  </p:cSld>
+  <p:clrMapOvr>
+    <a:masterClrMapping/>
+  </p:clrMapOvr>
+  <p:transition spd="med"/>
 </p:sld>
 </file>
 

</xml_diff>